<commit_message>
Add in some changes suggested by Mark. Add in PDF that was put into Indico.
</commit_message>
<xml_diff>
--- a/2015_DOE_Review/RemovedSlides.pptx
+++ b/2015_DOE_Review/RemovedSlides.pptx
@@ -6,12 +6,14 @@
     <p:sldMasterId id="2147483660" r:id="rId2"/>
     <p:sldMasterId id="2147483672" r:id="rId3"/>
     <p:sldMasterId id="2147483684" r:id="rId4"/>
+    <p:sldMasterId id="2147483696" r:id="rId5"/>
   </p:sldMasterIdLst>
   <p:sldIdLst>
-    <p:sldId id="256" r:id="rId5"/>
-    <p:sldId id="257" r:id="rId6"/>
-    <p:sldId id="258" r:id="rId7"/>
-    <p:sldId id="259" r:id="rId8"/>
+    <p:sldId id="256" r:id="rId6"/>
+    <p:sldId id="257" r:id="rId7"/>
+    <p:sldId id="258" r:id="rId8"/>
+    <p:sldId id="259" r:id="rId9"/>
+    <p:sldId id="260" r:id="rId10"/>
   </p:sldIdLst>
   <p:sldSz cx="9144000" cy="6858000" type="screen4x3"/>
   <p:notesSz cx="6858000" cy="9144000"/>
@@ -442,11 +444,11 @@
           <c:showPercent val="0"/>
           <c:showBubbleSize val="0"/>
         </c:dLbls>
-        <c:axId val="115444736"/>
-        <c:axId val="122566144"/>
+        <c:axId val="106379136"/>
+        <c:axId val="108122496"/>
       </c:scatterChart>
       <c:valAx>
-        <c:axId val="115444736"/>
+        <c:axId val="106379136"/>
         <c:scaling>
           <c:orientation val="minMax"/>
           <c:max val="200000"/>
@@ -517,12 +519,12 @@
             </a:solidFill>
           </a:ln>
         </c:spPr>
-        <c:crossAx val="122566144"/>
+        <c:crossAx val="108122496"/>
         <c:crossesAt val="0"/>
         <c:crossBetween val="midCat"/>
       </c:valAx>
       <c:valAx>
-        <c:axId val="122566144"/>
+        <c:axId val="108122496"/>
         <c:scaling>
           <c:orientation val="minMax"/>
         </c:scaling>
@@ -587,7 +589,7 @@
             </a:solidFill>
           </a:ln>
         </c:spPr>
-        <c:crossAx val="115444736"/>
+        <c:crossAx val="106379136"/>
         <c:crossesAt val="0"/>
         <c:crossBetween val="midCat"/>
       </c:valAx>
@@ -1254,11 +1256,11 @@
           <c:showPercent val="0"/>
           <c:showBubbleSize val="0"/>
         </c:dLbls>
-        <c:axId val="124930688"/>
-        <c:axId val="124949632"/>
+        <c:axId val="121996800"/>
+        <c:axId val="122003456"/>
       </c:scatterChart>
       <c:valAx>
-        <c:axId val="124930688"/>
+        <c:axId val="121996800"/>
         <c:scaling>
           <c:orientation val="minMax"/>
         </c:scaling>
@@ -1304,12 +1306,12 @@
         <c:majorTickMark val="out"/>
         <c:minorTickMark val="none"/>
         <c:tickLblPos val="nextTo"/>
-        <c:crossAx val="124949632"/>
+        <c:crossAx val="122003456"/>
         <c:crosses val="autoZero"/>
         <c:crossBetween val="midCat"/>
       </c:valAx>
       <c:valAx>
-        <c:axId val="124949632"/>
+        <c:axId val="122003456"/>
         <c:scaling>
           <c:orientation val="minMax"/>
         </c:scaling>
@@ -1350,7 +1352,7 @@
         <c:majorTickMark val="out"/>
         <c:minorTickMark val="none"/>
         <c:tickLblPos val="nextTo"/>
-        <c:crossAx val="124930688"/>
+        <c:crossAx val="121996800"/>
         <c:crosses val="autoZero"/>
         <c:crossBetween val="midCat"/>
       </c:valAx>
@@ -1626,11 +1628,11 @@
           <c:showPercent val="0"/>
           <c:showBubbleSize val="0"/>
         </c:dLbls>
-        <c:axId val="152444928"/>
-        <c:axId val="152447232"/>
+        <c:axId val="122139008"/>
+        <c:axId val="122141312"/>
       </c:scatterChart>
       <c:valAx>
-        <c:axId val="152444928"/>
+        <c:axId val="122139008"/>
         <c:scaling>
           <c:orientation val="minMax"/>
           <c:max val="17000"/>
@@ -1690,12 +1692,12 @@
         <c:majorTickMark val="out"/>
         <c:minorTickMark val="none"/>
         <c:tickLblPos val="nextTo"/>
-        <c:crossAx val="152447232"/>
+        <c:crossAx val="122141312"/>
         <c:crosses val="autoZero"/>
         <c:crossBetween val="midCat"/>
       </c:valAx>
       <c:valAx>
-        <c:axId val="152447232"/>
+        <c:axId val="122141312"/>
         <c:scaling>
           <c:orientation val="minMax"/>
         </c:scaling>
@@ -1753,7 +1755,7 @@
         <c:majorTickMark val="out"/>
         <c:minorTickMark val="none"/>
         <c:tickLblPos val="nextTo"/>
-        <c:crossAx val="152444928"/>
+        <c:crossAx val="122139008"/>
         <c:crosses val="autoZero"/>
         <c:crossBetween val="midCat"/>
       </c:valAx>
@@ -11895,7 +11897,1073 @@
 </p:sldLayout>
 </file>
 
-<file path=ppt/slideLayouts/slideLayout5.xml><?xml version="1.0" encoding="utf-8"?>
+<file path=ppt/slideLayouts/slideLayout45.xml><?xml version="1.0" encoding="utf-8"?>
+<p:sldLayout xmlns:a="http://schemas.openxmlformats.org/drawingml/2006/main" xmlns:r="http://schemas.openxmlformats.org/officeDocument/2006/relationships" xmlns:p="http://schemas.openxmlformats.org/presentationml/2006/main" type="title" preserve="1">
+  <p:cSld name="Title Slide">
+    <p:spTree>
+      <p:nvGrpSpPr>
+        <p:cNvPr id="1" name=""/>
+        <p:cNvGrpSpPr/>
+        <p:nvPr/>
+      </p:nvGrpSpPr>
+      <p:grpSpPr>
+        <a:xfrm>
+          <a:off x="0" y="0"/>
+          <a:ext cx="0" cy="0"/>
+          <a:chOff x="0" y="0"/>
+          <a:chExt cx="0" cy="0"/>
+        </a:xfrm>
+      </p:grpSpPr>
+      <p:sp>
+        <p:nvSpPr>
+          <p:cNvPr id="2" name="Title 1"/>
+          <p:cNvSpPr>
+            <a:spLocks noGrp="1"/>
+          </p:cNvSpPr>
+          <p:nvPr>
+            <p:ph type="ctrTitle"/>
+          </p:nvPr>
+        </p:nvSpPr>
+        <p:spPr>
+          <a:xfrm>
+            <a:off x="685800" y="2130425"/>
+            <a:ext cx="7772400" cy="1470025"/>
+          </a:xfrm>
+        </p:spPr>
+        <p:txBody>
+          <a:bodyPr/>
+          <a:lstStyle/>
+          <a:p>
+            <a:r>
+              <a:rPr lang="en-US" smtClean="0"/>
+              <a:t>Click to edit Master title style</a:t>
+            </a:r>
+            <a:endParaRPr lang="en-US"/>
+          </a:p>
+        </p:txBody>
+      </p:sp>
+      <p:sp>
+        <p:nvSpPr>
+          <p:cNvPr id="3" name="Subtitle 2"/>
+          <p:cNvSpPr>
+            <a:spLocks noGrp="1"/>
+          </p:cNvSpPr>
+          <p:nvPr>
+            <p:ph type="subTitle" idx="1"/>
+          </p:nvPr>
+        </p:nvSpPr>
+        <p:spPr>
+          <a:xfrm>
+            <a:off x="1371600" y="3886200"/>
+            <a:ext cx="6400800" cy="1752600"/>
+          </a:xfrm>
+        </p:spPr>
+        <p:txBody>
+          <a:bodyPr/>
+          <a:lstStyle>
+            <a:lvl1pPr marL="0" indent="0" algn="ctr">
+              <a:buNone/>
+              <a:defRPr>
+                <a:solidFill>
+                  <a:schemeClr val="tx1">
+                    <a:tint val="75000"/>
+                  </a:schemeClr>
+                </a:solidFill>
+              </a:defRPr>
+            </a:lvl1pPr>
+            <a:lvl2pPr marL="457200" indent="0" algn="ctr">
+              <a:buNone/>
+              <a:defRPr>
+                <a:solidFill>
+                  <a:schemeClr val="tx1">
+                    <a:tint val="75000"/>
+                  </a:schemeClr>
+                </a:solidFill>
+              </a:defRPr>
+            </a:lvl2pPr>
+            <a:lvl3pPr marL="914400" indent="0" algn="ctr">
+              <a:buNone/>
+              <a:defRPr>
+                <a:solidFill>
+                  <a:schemeClr val="tx1">
+                    <a:tint val="75000"/>
+                  </a:schemeClr>
+                </a:solidFill>
+              </a:defRPr>
+            </a:lvl3pPr>
+            <a:lvl4pPr marL="1371600" indent="0" algn="ctr">
+              <a:buNone/>
+              <a:defRPr>
+                <a:solidFill>
+                  <a:schemeClr val="tx1">
+                    <a:tint val="75000"/>
+                  </a:schemeClr>
+                </a:solidFill>
+              </a:defRPr>
+            </a:lvl4pPr>
+            <a:lvl5pPr marL="1828800" indent="0" algn="ctr">
+              <a:buNone/>
+              <a:defRPr>
+                <a:solidFill>
+                  <a:schemeClr val="tx1">
+                    <a:tint val="75000"/>
+                  </a:schemeClr>
+                </a:solidFill>
+              </a:defRPr>
+            </a:lvl5pPr>
+            <a:lvl6pPr marL="2286000" indent="0" algn="ctr">
+              <a:buNone/>
+              <a:defRPr>
+                <a:solidFill>
+                  <a:schemeClr val="tx1">
+                    <a:tint val="75000"/>
+                  </a:schemeClr>
+                </a:solidFill>
+              </a:defRPr>
+            </a:lvl6pPr>
+            <a:lvl7pPr marL="2743200" indent="0" algn="ctr">
+              <a:buNone/>
+              <a:defRPr>
+                <a:solidFill>
+                  <a:schemeClr val="tx1">
+                    <a:tint val="75000"/>
+                  </a:schemeClr>
+                </a:solidFill>
+              </a:defRPr>
+            </a:lvl7pPr>
+            <a:lvl8pPr marL="3200400" indent="0" algn="ctr">
+              <a:buNone/>
+              <a:defRPr>
+                <a:solidFill>
+                  <a:schemeClr val="tx1">
+                    <a:tint val="75000"/>
+                  </a:schemeClr>
+                </a:solidFill>
+              </a:defRPr>
+            </a:lvl8pPr>
+            <a:lvl9pPr marL="3657600" indent="0" algn="ctr">
+              <a:buNone/>
+              <a:defRPr>
+                <a:solidFill>
+                  <a:schemeClr val="tx1">
+                    <a:tint val="75000"/>
+                  </a:schemeClr>
+                </a:solidFill>
+              </a:defRPr>
+            </a:lvl9pPr>
+          </a:lstStyle>
+          <a:p>
+            <a:r>
+              <a:rPr lang="en-US" smtClean="0"/>
+              <a:t>Click to edit Master subtitle style</a:t>
+            </a:r>
+            <a:endParaRPr lang="en-US"/>
+          </a:p>
+        </p:txBody>
+      </p:sp>
+      <p:sp>
+        <p:nvSpPr>
+          <p:cNvPr id="4" name="Date Placeholder 3"/>
+          <p:cNvSpPr>
+            <a:spLocks noGrp="1"/>
+          </p:cNvSpPr>
+          <p:nvPr>
+            <p:ph type="dt" sz="half" idx="10"/>
+          </p:nvPr>
+        </p:nvSpPr>
+        <p:spPr/>
+        <p:txBody>
+          <a:bodyPr/>
+          <a:lstStyle/>
+          <a:p>
+            <a:fld id="{B41FAE2C-98F2-4AEB-9028-7681F5825C1E}" type="datetimeFigureOut">
+              <a:rPr lang="en-US" smtClean="0">
+                <a:solidFill>
+                  <a:prstClr val="white"/>
+                </a:solidFill>
+              </a:rPr>
+              <a:pPr/>
+              <a:t>11/11/2015</a:t>
+            </a:fld>
+            <a:endParaRPr lang="en-US">
+              <a:solidFill>
+                <a:prstClr val="white"/>
+              </a:solidFill>
+            </a:endParaRPr>
+          </a:p>
+        </p:txBody>
+      </p:sp>
+      <p:sp>
+        <p:nvSpPr>
+          <p:cNvPr id="5" name="Footer Placeholder 4"/>
+          <p:cNvSpPr>
+            <a:spLocks noGrp="1"/>
+          </p:cNvSpPr>
+          <p:nvPr>
+            <p:ph type="ftr" sz="quarter" idx="11"/>
+          </p:nvPr>
+        </p:nvSpPr>
+        <p:spPr>
+          <a:xfrm>
+            <a:off x="3124200" y="6356350"/>
+            <a:ext cx="2895600" cy="365125"/>
+          </a:xfrm>
+          <a:prstGeom prst="rect">
+            <a:avLst/>
+          </a:prstGeom>
+        </p:spPr>
+        <p:txBody>
+          <a:bodyPr/>
+          <a:lstStyle/>
+          <a:p>
+            <a:endParaRPr lang="en-US">
+              <a:solidFill>
+                <a:prstClr val="black"/>
+              </a:solidFill>
+            </a:endParaRPr>
+          </a:p>
+        </p:txBody>
+      </p:sp>
+      <p:sp>
+        <p:nvSpPr>
+          <p:cNvPr id="6" name="Slide Number Placeholder 5"/>
+          <p:cNvSpPr>
+            <a:spLocks noGrp="1"/>
+          </p:cNvSpPr>
+          <p:nvPr>
+            <p:ph type="sldNum" sz="quarter" idx="12"/>
+          </p:nvPr>
+        </p:nvSpPr>
+        <p:spPr/>
+        <p:txBody>
+          <a:bodyPr/>
+          <a:lstStyle/>
+          <a:p>
+            <a:fld id="{123908D8-EB8A-4839-B5DA-E27DEBBAC624}" type="slidenum">
+              <a:rPr lang="en-US" smtClean="0">
+                <a:solidFill>
+                  <a:prstClr val="white"/>
+                </a:solidFill>
+              </a:rPr>
+              <a:pPr/>
+              <a:t>‹#›</a:t>
+            </a:fld>
+            <a:endParaRPr lang="en-US">
+              <a:solidFill>
+                <a:prstClr val="white"/>
+              </a:solidFill>
+            </a:endParaRPr>
+          </a:p>
+        </p:txBody>
+      </p:sp>
+    </p:spTree>
+    <p:extLst>
+      <p:ext uri="{BB962C8B-B14F-4D97-AF65-F5344CB8AC3E}">
+        <p14:creationId xmlns:p14="http://schemas.microsoft.com/office/powerpoint/2010/main" val="433711324"/>
+      </p:ext>
+    </p:extLst>
+  </p:cSld>
+  <p:clrMapOvr>
+    <a:masterClrMapping/>
+  </p:clrMapOvr>
+</p:sldLayout>
+</file>
+
+<file path=ppt/slideLayouts/slideLayout46.xml><?xml version="1.0" encoding="utf-8"?>
+<p:sldLayout xmlns:a="http://schemas.openxmlformats.org/drawingml/2006/main" xmlns:r="http://schemas.openxmlformats.org/officeDocument/2006/relationships" xmlns:p="http://schemas.openxmlformats.org/presentationml/2006/main" type="obj" preserve="1">
+  <p:cSld name="Title and Content">
+    <p:spTree>
+      <p:nvGrpSpPr>
+        <p:cNvPr id="1" name=""/>
+        <p:cNvGrpSpPr/>
+        <p:nvPr/>
+      </p:nvGrpSpPr>
+      <p:grpSpPr>
+        <a:xfrm>
+          <a:off x="0" y="0"/>
+          <a:ext cx="0" cy="0"/>
+          <a:chOff x="0" y="0"/>
+          <a:chExt cx="0" cy="0"/>
+        </a:xfrm>
+      </p:grpSpPr>
+      <p:sp>
+        <p:nvSpPr>
+          <p:cNvPr id="2" name="Title 1"/>
+          <p:cNvSpPr>
+            <a:spLocks noGrp="1"/>
+          </p:cNvSpPr>
+          <p:nvPr>
+            <p:ph type="title"/>
+          </p:nvPr>
+        </p:nvSpPr>
+        <p:spPr/>
+        <p:txBody>
+          <a:bodyPr/>
+          <a:lstStyle/>
+          <a:p>
+            <a:r>
+              <a:rPr lang="en-US" smtClean="0"/>
+              <a:t>Click to edit Master title style</a:t>
+            </a:r>
+            <a:endParaRPr lang="en-US"/>
+          </a:p>
+        </p:txBody>
+      </p:sp>
+      <p:sp>
+        <p:nvSpPr>
+          <p:cNvPr id="3" name="Content Placeholder 2"/>
+          <p:cNvSpPr>
+            <a:spLocks noGrp="1"/>
+          </p:cNvSpPr>
+          <p:nvPr>
+            <p:ph idx="1"/>
+          </p:nvPr>
+        </p:nvSpPr>
+        <p:spPr/>
+        <p:txBody>
+          <a:bodyPr/>
+          <a:lstStyle/>
+          <a:p>
+            <a:pPr lvl="0"/>
+            <a:r>
+              <a:rPr lang="en-US" smtClean="0"/>
+              <a:t>Click to edit Master text styles</a:t>
+            </a:r>
+          </a:p>
+          <a:p>
+            <a:pPr lvl="1"/>
+            <a:r>
+              <a:rPr lang="en-US" smtClean="0"/>
+              <a:t>Second level</a:t>
+            </a:r>
+          </a:p>
+          <a:p>
+            <a:pPr lvl="2"/>
+            <a:r>
+              <a:rPr lang="en-US" smtClean="0"/>
+              <a:t>Third level</a:t>
+            </a:r>
+          </a:p>
+          <a:p>
+            <a:pPr lvl="3"/>
+            <a:r>
+              <a:rPr lang="en-US" smtClean="0"/>
+              <a:t>Fourth level</a:t>
+            </a:r>
+          </a:p>
+          <a:p>
+            <a:pPr lvl="4"/>
+            <a:r>
+              <a:rPr lang="en-US" smtClean="0"/>
+              <a:t>Fifth level</a:t>
+            </a:r>
+            <a:endParaRPr lang="en-US"/>
+          </a:p>
+        </p:txBody>
+      </p:sp>
+      <p:sp>
+        <p:nvSpPr>
+          <p:cNvPr id="4" name="Date Placeholder 3"/>
+          <p:cNvSpPr>
+            <a:spLocks noGrp="1"/>
+          </p:cNvSpPr>
+          <p:nvPr>
+            <p:ph type="dt" sz="half" idx="10"/>
+          </p:nvPr>
+        </p:nvSpPr>
+        <p:spPr/>
+        <p:txBody>
+          <a:bodyPr/>
+          <a:lstStyle/>
+          <a:p>
+            <a:fld id="{B41FAE2C-98F2-4AEB-9028-7681F5825C1E}" type="datetimeFigureOut">
+              <a:rPr lang="en-US" smtClean="0">
+                <a:solidFill>
+                  <a:prstClr val="white"/>
+                </a:solidFill>
+              </a:rPr>
+              <a:pPr/>
+              <a:t>11/11/2015</a:t>
+            </a:fld>
+            <a:endParaRPr lang="en-US">
+              <a:solidFill>
+                <a:prstClr val="white"/>
+              </a:solidFill>
+            </a:endParaRPr>
+          </a:p>
+        </p:txBody>
+      </p:sp>
+      <p:sp>
+        <p:nvSpPr>
+          <p:cNvPr id="5" name="Footer Placeholder 4"/>
+          <p:cNvSpPr>
+            <a:spLocks noGrp="1"/>
+          </p:cNvSpPr>
+          <p:nvPr>
+            <p:ph type="ftr" sz="quarter" idx="11"/>
+          </p:nvPr>
+        </p:nvSpPr>
+        <p:spPr>
+          <a:xfrm>
+            <a:off x="3124200" y="6356350"/>
+            <a:ext cx="2895600" cy="365125"/>
+          </a:xfrm>
+          <a:prstGeom prst="rect">
+            <a:avLst/>
+          </a:prstGeom>
+        </p:spPr>
+        <p:txBody>
+          <a:bodyPr/>
+          <a:lstStyle/>
+          <a:p>
+            <a:endParaRPr lang="en-US">
+              <a:solidFill>
+                <a:prstClr val="black"/>
+              </a:solidFill>
+            </a:endParaRPr>
+          </a:p>
+        </p:txBody>
+      </p:sp>
+      <p:sp>
+        <p:nvSpPr>
+          <p:cNvPr id="6" name="Slide Number Placeholder 5"/>
+          <p:cNvSpPr>
+            <a:spLocks noGrp="1"/>
+          </p:cNvSpPr>
+          <p:nvPr>
+            <p:ph type="sldNum" sz="quarter" idx="12"/>
+          </p:nvPr>
+        </p:nvSpPr>
+        <p:spPr/>
+        <p:txBody>
+          <a:bodyPr/>
+          <a:lstStyle/>
+          <a:p>
+            <a:fld id="{123908D8-EB8A-4839-B5DA-E27DEBBAC624}" type="slidenum">
+              <a:rPr lang="en-US" smtClean="0">
+                <a:solidFill>
+                  <a:prstClr val="white"/>
+                </a:solidFill>
+              </a:rPr>
+              <a:pPr/>
+              <a:t>‹#›</a:t>
+            </a:fld>
+            <a:endParaRPr lang="en-US">
+              <a:solidFill>
+                <a:prstClr val="white"/>
+              </a:solidFill>
+            </a:endParaRPr>
+          </a:p>
+        </p:txBody>
+      </p:sp>
+    </p:spTree>
+    <p:extLst>
+      <p:ext uri="{BB962C8B-B14F-4D97-AF65-F5344CB8AC3E}">
+        <p14:creationId xmlns:p14="http://schemas.microsoft.com/office/powerpoint/2010/main" val="634693356"/>
+      </p:ext>
+    </p:extLst>
+  </p:cSld>
+  <p:clrMapOvr>
+    <a:masterClrMapping/>
+  </p:clrMapOvr>
+</p:sldLayout>
+</file>
+
+<file path=ppt/slideLayouts/slideLayout47.xml><?xml version="1.0" encoding="utf-8"?>
+<p:sldLayout xmlns:a="http://schemas.openxmlformats.org/drawingml/2006/main" xmlns:r="http://schemas.openxmlformats.org/officeDocument/2006/relationships" xmlns:p="http://schemas.openxmlformats.org/presentationml/2006/main" type="secHead" preserve="1">
+  <p:cSld name="Section Header">
+    <p:spTree>
+      <p:nvGrpSpPr>
+        <p:cNvPr id="1" name=""/>
+        <p:cNvGrpSpPr/>
+        <p:nvPr/>
+      </p:nvGrpSpPr>
+      <p:grpSpPr>
+        <a:xfrm>
+          <a:off x="0" y="0"/>
+          <a:ext cx="0" cy="0"/>
+          <a:chOff x="0" y="0"/>
+          <a:chExt cx="0" cy="0"/>
+        </a:xfrm>
+      </p:grpSpPr>
+      <p:sp>
+        <p:nvSpPr>
+          <p:cNvPr id="2" name="Title 1"/>
+          <p:cNvSpPr>
+            <a:spLocks noGrp="1"/>
+          </p:cNvSpPr>
+          <p:nvPr>
+            <p:ph type="title"/>
+          </p:nvPr>
+        </p:nvSpPr>
+        <p:spPr>
+          <a:xfrm>
+            <a:off x="722313" y="4406900"/>
+            <a:ext cx="7772400" cy="1362075"/>
+          </a:xfrm>
+        </p:spPr>
+        <p:txBody>
+          <a:bodyPr anchor="t"/>
+          <a:lstStyle>
+            <a:lvl1pPr algn="l">
+              <a:defRPr sz="4000" b="1" cap="all"/>
+            </a:lvl1pPr>
+          </a:lstStyle>
+          <a:p>
+            <a:r>
+              <a:rPr lang="en-US" smtClean="0"/>
+              <a:t>Click to edit Master title style</a:t>
+            </a:r>
+            <a:endParaRPr lang="en-US"/>
+          </a:p>
+        </p:txBody>
+      </p:sp>
+      <p:sp>
+        <p:nvSpPr>
+          <p:cNvPr id="3" name="Text Placeholder 2"/>
+          <p:cNvSpPr>
+            <a:spLocks noGrp="1"/>
+          </p:cNvSpPr>
+          <p:nvPr>
+            <p:ph type="body" idx="1"/>
+          </p:nvPr>
+        </p:nvSpPr>
+        <p:spPr>
+          <a:xfrm>
+            <a:off x="722313" y="2906713"/>
+            <a:ext cx="7772400" cy="1500187"/>
+          </a:xfrm>
+        </p:spPr>
+        <p:txBody>
+          <a:bodyPr anchor="b"/>
+          <a:lstStyle>
+            <a:lvl1pPr marL="0" indent="0">
+              <a:buNone/>
+              <a:defRPr sz="2000">
+                <a:solidFill>
+                  <a:schemeClr val="tx1">
+                    <a:tint val="75000"/>
+                  </a:schemeClr>
+                </a:solidFill>
+              </a:defRPr>
+            </a:lvl1pPr>
+            <a:lvl2pPr marL="457200" indent="0">
+              <a:buNone/>
+              <a:defRPr sz="1800">
+                <a:solidFill>
+                  <a:schemeClr val="tx1">
+                    <a:tint val="75000"/>
+                  </a:schemeClr>
+                </a:solidFill>
+              </a:defRPr>
+            </a:lvl2pPr>
+            <a:lvl3pPr marL="914400" indent="0">
+              <a:buNone/>
+              <a:defRPr sz="1600">
+                <a:solidFill>
+                  <a:schemeClr val="tx1">
+                    <a:tint val="75000"/>
+                  </a:schemeClr>
+                </a:solidFill>
+              </a:defRPr>
+            </a:lvl3pPr>
+            <a:lvl4pPr marL="1371600" indent="0">
+              <a:buNone/>
+              <a:defRPr sz="1400">
+                <a:solidFill>
+                  <a:schemeClr val="tx1">
+                    <a:tint val="75000"/>
+                  </a:schemeClr>
+                </a:solidFill>
+              </a:defRPr>
+            </a:lvl4pPr>
+            <a:lvl5pPr marL="1828800" indent="0">
+              <a:buNone/>
+              <a:defRPr sz="1400">
+                <a:solidFill>
+                  <a:schemeClr val="tx1">
+                    <a:tint val="75000"/>
+                  </a:schemeClr>
+                </a:solidFill>
+              </a:defRPr>
+            </a:lvl5pPr>
+            <a:lvl6pPr marL="2286000" indent="0">
+              <a:buNone/>
+              <a:defRPr sz="1400">
+                <a:solidFill>
+                  <a:schemeClr val="tx1">
+                    <a:tint val="75000"/>
+                  </a:schemeClr>
+                </a:solidFill>
+              </a:defRPr>
+            </a:lvl6pPr>
+            <a:lvl7pPr marL="2743200" indent="0">
+              <a:buNone/>
+              <a:defRPr sz="1400">
+                <a:solidFill>
+                  <a:schemeClr val="tx1">
+                    <a:tint val="75000"/>
+                  </a:schemeClr>
+                </a:solidFill>
+              </a:defRPr>
+            </a:lvl7pPr>
+            <a:lvl8pPr marL="3200400" indent="0">
+              <a:buNone/>
+              <a:defRPr sz="1400">
+                <a:solidFill>
+                  <a:schemeClr val="tx1">
+                    <a:tint val="75000"/>
+                  </a:schemeClr>
+                </a:solidFill>
+              </a:defRPr>
+            </a:lvl8pPr>
+            <a:lvl9pPr marL="3657600" indent="0">
+              <a:buNone/>
+              <a:defRPr sz="1400">
+                <a:solidFill>
+                  <a:schemeClr val="tx1">
+                    <a:tint val="75000"/>
+                  </a:schemeClr>
+                </a:solidFill>
+              </a:defRPr>
+            </a:lvl9pPr>
+          </a:lstStyle>
+          <a:p>
+            <a:pPr lvl="0"/>
+            <a:r>
+              <a:rPr lang="en-US" smtClean="0"/>
+              <a:t>Click to edit Master text styles</a:t>
+            </a:r>
+          </a:p>
+        </p:txBody>
+      </p:sp>
+      <p:sp>
+        <p:nvSpPr>
+          <p:cNvPr id="4" name="Date Placeholder 3"/>
+          <p:cNvSpPr>
+            <a:spLocks noGrp="1"/>
+          </p:cNvSpPr>
+          <p:nvPr>
+            <p:ph type="dt" sz="half" idx="10"/>
+          </p:nvPr>
+        </p:nvSpPr>
+        <p:spPr/>
+        <p:txBody>
+          <a:bodyPr/>
+          <a:lstStyle/>
+          <a:p>
+            <a:fld id="{B41FAE2C-98F2-4AEB-9028-7681F5825C1E}" type="datetimeFigureOut">
+              <a:rPr lang="en-US" smtClean="0">
+                <a:solidFill>
+                  <a:prstClr val="white"/>
+                </a:solidFill>
+              </a:rPr>
+              <a:pPr/>
+              <a:t>11/11/2015</a:t>
+            </a:fld>
+            <a:endParaRPr lang="en-US">
+              <a:solidFill>
+                <a:prstClr val="white"/>
+              </a:solidFill>
+            </a:endParaRPr>
+          </a:p>
+        </p:txBody>
+      </p:sp>
+      <p:sp>
+        <p:nvSpPr>
+          <p:cNvPr id="5" name="Footer Placeholder 4"/>
+          <p:cNvSpPr>
+            <a:spLocks noGrp="1"/>
+          </p:cNvSpPr>
+          <p:nvPr>
+            <p:ph type="ftr" sz="quarter" idx="11"/>
+          </p:nvPr>
+        </p:nvSpPr>
+        <p:spPr>
+          <a:xfrm>
+            <a:off x="3124200" y="6356350"/>
+            <a:ext cx="2895600" cy="365125"/>
+          </a:xfrm>
+          <a:prstGeom prst="rect">
+            <a:avLst/>
+          </a:prstGeom>
+        </p:spPr>
+        <p:txBody>
+          <a:bodyPr/>
+          <a:lstStyle/>
+          <a:p>
+            <a:endParaRPr lang="en-US">
+              <a:solidFill>
+                <a:prstClr val="black"/>
+              </a:solidFill>
+            </a:endParaRPr>
+          </a:p>
+        </p:txBody>
+      </p:sp>
+      <p:sp>
+        <p:nvSpPr>
+          <p:cNvPr id="6" name="Slide Number Placeholder 5"/>
+          <p:cNvSpPr>
+            <a:spLocks noGrp="1"/>
+          </p:cNvSpPr>
+          <p:nvPr>
+            <p:ph type="sldNum" sz="quarter" idx="12"/>
+          </p:nvPr>
+        </p:nvSpPr>
+        <p:spPr/>
+        <p:txBody>
+          <a:bodyPr/>
+          <a:lstStyle/>
+          <a:p>
+            <a:fld id="{123908D8-EB8A-4839-B5DA-E27DEBBAC624}" type="slidenum">
+              <a:rPr lang="en-US" smtClean="0">
+                <a:solidFill>
+                  <a:prstClr val="white"/>
+                </a:solidFill>
+              </a:rPr>
+              <a:pPr/>
+              <a:t>‹#›</a:t>
+            </a:fld>
+            <a:endParaRPr lang="en-US">
+              <a:solidFill>
+                <a:prstClr val="white"/>
+              </a:solidFill>
+            </a:endParaRPr>
+          </a:p>
+        </p:txBody>
+      </p:sp>
+    </p:spTree>
+    <p:extLst>
+      <p:ext uri="{BB962C8B-B14F-4D97-AF65-F5344CB8AC3E}">
+        <p14:creationId xmlns:p14="http://schemas.microsoft.com/office/powerpoint/2010/main" val="4027068091"/>
+      </p:ext>
+    </p:extLst>
+  </p:cSld>
+  <p:clrMapOvr>
+    <a:masterClrMapping/>
+  </p:clrMapOvr>
+</p:sldLayout>
+</file>
+
+<file path=ppt/slideLayouts/slideLayout48.xml><?xml version="1.0" encoding="utf-8"?>
+<p:sldLayout xmlns:a="http://schemas.openxmlformats.org/drawingml/2006/main" xmlns:r="http://schemas.openxmlformats.org/officeDocument/2006/relationships" xmlns:p="http://schemas.openxmlformats.org/presentationml/2006/main" type="twoObj" preserve="1">
+  <p:cSld name="Two Content">
+    <p:spTree>
+      <p:nvGrpSpPr>
+        <p:cNvPr id="1" name=""/>
+        <p:cNvGrpSpPr/>
+        <p:nvPr/>
+      </p:nvGrpSpPr>
+      <p:grpSpPr>
+        <a:xfrm>
+          <a:off x="0" y="0"/>
+          <a:ext cx="0" cy="0"/>
+          <a:chOff x="0" y="0"/>
+          <a:chExt cx="0" cy="0"/>
+        </a:xfrm>
+      </p:grpSpPr>
+      <p:sp>
+        <p:nvSpPr>
+          <p:cNvPr id="2" name="Title 1"/>
+          <p:cNvSpPr>
+            <a:spLocks noGrp="1"/>
+          </p:cNvSpPr>
+          <p:nvPr>
+            <p:ph type="title"/>
+          </p:nvPr>
+        </p:nvSpPr>
+        <p:spPr/>
+        <p:txBody>
+          <a:bodyPr/>
+          <a:lstStyle/>
+          <a:p>
+            <a:r>
+              <a:rPr lang="en-US" smtClean="0"/>
+              <a:t>Click to edit Master title style</a:t>
+            </a:r>
+            <a:endParaRPr lang="en-US"/>
+          </a:p>
+        </p:txBody>
+      </p:sp>
+      <p:sp>
+        <p:nvSpPr>
+          <p:cNvPr id="3" name="Content Placeholder 2"/>
+          <p:cNvSpPr>
+            <a:spLocks noGrp="1"/>
+          </p:cNvSpPr>
+          <p:nvPr>
+            <p:ph sz="half" idx="1"/>
+          </p:nvPr>
+        </p:nvSpPr>
+        <p:spPr>
+          <a:xfrm>
+            <a:off x="457200" y="1600200"/>
+            <a:ext cx="4038600" cy="4525963"/>
+          </a:xfrm>
+        </p:spPr>
+        <p:txBody>
+          <a:bodyPr/>
+          <a:lstStyle>
+            <a:lvl1pPr>
+              <a:defRPr sz="2800"/>
+            </a:lvl1pPr>
+            <a:lvl2pPr>
+              <a:defRPr sz="2400"/>
+            </a:lvl2pPr>
+            <a:lvl3pPr>
+              <a:defRPr sz="2000"/>
+            </a:lvl3pPr>
+            <a:lvl4pPr>
+              <a:defRPr sz="1800"/>
+            </a:lvl4pPr>
+            <a:lvl5pPr>
+              <a:defRPr sz="1800"/>
+            </a:lvl5pPr>
+            <a:lvl6pPr>
+              <a:defRPr sz="1800"/>
+            </a:lvl6pPr>
+            <a:lvl7pPr>
+              <a:defRPr sz="1800"/>
+            </a:lvl7pPr>
+            <a:lvl8pPr>
+              <a:defRPr sz="1800"/>
+            </a:lvl8pPr>
+            <a:lvl9pPr>
+              <a:defRPr sz="1800"/>
+            </a:lvl9pPr>
+          </a:lstStyle>
+          <a:p>
+            <a:pPr lvl="0"/>
+            <a:r>
+              <a:rPr lang="en-US" smtClean="0"/>
+              <a:t>Click to edit Master text styles</a:t>
+            </a:r>
+          </a:p>
+          <a:p>
+            <a:pPr lvl="1"/>
+            <a:r>
+              <a:rPr lang="en-US" smtClean="0"/>
+              <a:t>Second level</a:t>
+            </a:r>
+          </a:p>
+          <a:p>
+            <a:pPr lvl="2"/>
+            <a:r>
+              <a:rPr lang="en-US" smtClean="0"/>
+              <a:t>Third level</a:t>
+            </a:r>
+          </a:p>
+          <a:p>
+            <a:pPr lvl="3"/>
+            <a:r>
+              <a:rPr lang="en-US" smtClean="0"/>
+              <a:t>Fourth level</a:t>
+            </a:r>
+          </a:p>
+          <a:p>
+            <a:pPr lvl="4"/>
+            <a:r>
+              <a:rPr lang="en-US" smtClean="0"/>
+              <a:t>Fifth level</a:t>
+            </a:r>
+            <a:endParaRPr lang="en-US"/>
+          </a:p>
+        </p:txBody>
+      </p:sp>
+      <p:sp>
+        <p:nvSpPr>
+          <p:cNvPr id="4" name="Content Placeholder 3"/>
+          <p:cNvSpPr>
+            <a:spLocks noGrp="1"/>
+          </p:cNvSpPr>
+          <p:nvPr>
+            <p:ph sz="half" idx="2"/>
+          </p:nvPr>
+        </p:nvSpPr>
+        <p:spPr>
+          <a:xfrm>
+            <a:off x="4648200" y="1600200"/>
+            <a:ext cx="4038600" cy="4525963"/>
+          </a:xfrm>
+        </p:spPr>
+        <p:txBody>
+          <a:bodyPr/>
+          <a:lstStyle>
+            <a:lvl1pPr>
+              <a:defRPr sz="2800"/>
+            </a:lvl1pPr>
+            <a:lvl2pPr>
+              <a:defRPr sz="2400"/>
+            </a:lvl2pPr>
+            <a:lvl3pPr>
+              <a:defRPr sz="2000"/>
+            </a:lvl3pPr>
+            <a:lvl4pPr>
+              <a:defRPr sz="1800"/>
+            </a:lvl4pPr>
+            <a:lvl5pPr>
+              <a:defRPr sz="1800"/>
+            </a:lvl5pPr>
+            <a:lvl6pPr>
+              <a:defRPr sz="1800"/>
+            </a:lvl6pPr>
+            <a:lvl7pPr>
+              <a:defRPr sz="1800"/>
+            </a:lvl7pPr>
+            <a:lvl8pPr>
+              <a:defRPr sz="1800"/>
+            </a:lvl8pPr>
+            <a:lvl9pPr>
+              <a:defRPr sz="1800"/>
+            </a:lvl9pPr>
+          </a:lstStyle>
+          <a:p>
+            <a:pPr lvl="0"/>
+            <a:r>
+              <a:rPr lang="en-US" smtClean="0"/>
+              <a:t>Click to edit Master text styles</a:t>
+            </a:r>
+          </a:p>
+          <a:p>
+            <a:pPr lvl="1"/>
+            <a:r>
+              <a:rPr lang="en-US" smtClean="0"/>
+              <a:t>Second level</a:t>
+            </a:r>
+          </a:p>
+          <a:p>
+            <a:pPr lvl="2"/>
+            <a:r>
+              <a:rPr lang="en-US" smtClean="0"/>
+              <a:t>Third level</a:t>
+            </a:r>
+          </a:p>
+          <a:p>
+            <a:pPr lvl="3"/>
+            <a:r>
+              <a:rPr lang="en-US" smtClean="0"/>
+              <a:t>Fourth level</a:t>
+            </a:r>
+          </a:p>
+          <a:p>
+            <a:pPr lvl="4"/>
+            <a:r>
+              <a:rPr lang="en-US" smtClean="0"/>
+              <a:t>Fifth level</a:t>
+            </a:r>
+            <a:endParaRPr lang="en-US"/>
+          </a:p>
+        </p:txBody>
+      </p:sp>
+      <p:sp>
+        <p:nvSpPr>
+          <p:cNvPr id="5" name="Date Placeholder 4"/>
+          <p:cNvSpPr>
+            <a:spLocks noGrp="1"/>
+          </p:cNvSpPr>
+          <p:nvPr>
+            <p:ph type="dt" sz="half" idx="10"/>
+          </p:nvPr>
+        </p:nvSpPr>
+        <p:spPr/>
+        <p:txBody>
+          <a:bodyPr/>
+          <a:lstStyle/>
+          <a:p>
+            <a:fld id="{B41FAE2C-98F2-4AEB-9028-7681F5825C1E}" type="datetimeFigureOut">
+              <a:rPr lang="en-US" smtClean="0">
+                <a:solidFill>
+                  <a:prstClr val="white"/>
+                </a:solidFill>
+              </a:rPr>
+              <a:pPr/>
+              <a:t>11/11/2015</a:t>
+            </a:fld>
+            <a:endParaRPr lang="en-US">
+              <a:solidFill>
+                <a:prstClr val="white"/>
+              </a:solidFill>
+            </a:endParaRPr>
+          </a:p>
+        </p:txBody>
+      </p:sp>
+      <p:sp>
+        <p:nvSpPr>
+          <p:cNvPr id="6" name="Footer Placeholder 5"/>
+          <p:cNvSpPr>
+            <a:spLocks noGrp="1"/>
+          </p:cNvSpPr>
+          <p:nvPr>
+            <p:ph type="ftr" sz="quarter" idx="11"/>
+          </p:nvPr>
+        </p:nvSpPr>
+        <p:spPr>
+          <a:xfrm>
+            <a:off x="3124200" y="6356350"/>
+            <a:ext cx="2895600" cy="365125"/>
+          </a:xfrm>
+          <a:prstGeom prst="rect">
+            <a:avLst/>
+          </a:prstGeom>
+        </p:spPr>
+        <p:txBody>
+          <a:bodyPr/>
+          <a:lstStyle/>
+          <a:p>
+            <a:endParaRPr lang="en-US">
+              <a:solidFill>
+                <a:prstClr val="black"/>
+              </a:solidFill>
+            </a:endParaRPr>
+          </a:p>
+        </p:txBody>
+      </p:sp>
+      <p:sp>
+        <p:nvSpPr>
+          <p:cNvPr id="7" name="Slide Number Placeholder 6"/>
+          <p:cNvSpPr>
+            <a:spLocks noGrp="1"/>
+          </p:cNvSpPr>
+          <p:nvPr>
+            <p:ph type="sldNum" sz="quarter" idx="12"/>
+          </p:nvPr>
+        </p:nvSpPr>
+        <p:spPr/>
+        <p:txBody>
+          <a:bodyPr/>
+          <a:lstStyle/>
+          <a:p>
+            <a:fld id="{123908D8-EB8A-4839-B5DA-E27DEBBAC624}" type="slidenum">
+              <a:rPr lang="en-US" smtClean="0">
+                <a:solidFill>
+                  <a:prstClr val="white"/>
+                </a:solidFill>
+              </a:rPr>
+              <a:pPr/>
+              <a:t>‹#›</a:t>
+            </a:fld>
+            <a:endParaRPr lang="en-US">
+              <a:solidFill>
+                <a:prstClr val="white"/>
+              </a:solidFill>
+            </a:endParaRPr>
+          </a:p>
+        </p:txBody>
+      </p:sp>
+    </p:spTree>
+    <p:extLst>
+      <p:ext uri="{BB962C8B-B14F-4D97-AF65-F5344CB8AC3E}">
+        <p14:creationId xmlns:p14="http://schemas.microsoft.com/office/powerpoint/2010/main" val="2296373550"/>
+      </p:ext>
+    </p:extLst>
+  </p:cSld>
+  <p:clrMapOvr>
+    <a:masterClrMapping/>
+  </p:clrMapOvr>
+</p:sldLayout>
+</file>
+
+<file path=ppt/slideLayouts/slideLayout49.xml><?xml version="1.0" encoding="utf-8"?>
 <p:sldLayout xmlns:a="http://schemas.openxmlformats.org/drawingml/2006/main" xmlns:r="http://schemas.openxmlformats.org/officeDocument/2006/relationships" xmlns:p="http://schemas.openxmlformats.org/presentationml/2006/main" type="twoTxTwoObj" preserve="1">
   <p:cSld name="Comparison">
     <p:spTree>
@@ -12254,6 +13322,465 @@
           <a:bodyPr/>
           <a:lstStyle/>
           <a:p>
+            <a:fld id="{B41FAE2C-98F2-4AEB-9028-7681F5825C1E}" type="datetimeFigureOut">
+              <a:rPr lang="en-US" smtClean="0">
+                <a:solidFill>
+                  <a:prstClr val="white"/>
+                </a:solidFill>
+              </a:rPr>
+              <a:pPr/>
+              <a:t>11/11/2015</a:t>
+            </a:fld>
+            <a:endParaRPr lang="en-US">
+              <a:solidFill>
+                <a:prstClr val="white"/>
+              </a:solidFill>
+            </a:endParaRPr>
+          </a:p>
+        </p:txBody>
+      </p:sp>
+      <p:sp>
+        <p:nvSpPr>
+          <p:cNvPr id="8" name="Footer Placeholder 7"/>
+          <p:cNvSpPr>
+            <a:spLocks noGrp="1"/>
+          </p:cNvSpPr>
+          <p:nvPr>
+            <p:ph type="ftr" sz="quarter" idx="11"/>
+          </p:nvPr>
+        </p:nvSpPr>
+        <p:spPr>
+          <a:xfrm>
+            <a:off x="3124200" y="6356350"/>
+            <a:ext cx="2895600" cy="365125"/>
+          </a:xfrm>
+          <a:prstGeom prst="rect">
+            <a:avLst/>
+          </a:prstGeom>
+        </p:spPr>
+        <p:txBody>
+          <a:bodyPr/>
+          <a:lstStyle/>
+          <a:p>
+            <a:endParaRPr lang="en-US">
+              <a:solidFill>
+                <a:prstClr val="black"/>
+              </a:solidFill>
+            </a:endParaRPr>
+          </a:p>
+        </p:txBody>
+      </p:sp>
+      <p:sp>
+        <p:nvSpPr>
+          <p:cNvPr id="9" name="Slide Number Placeholder 8"/>
+          <p:cNvSpPr>
+            <a:spLocks noGrp="1"/>
+          </p:cNvSpPr>
+          <p:nvPr>
+            <p:ph type="sldNum" sz="quarter" idx="12"/>
+          </p:nvPr>
+        </p:nvSpPr>
+        <p:spPr/>
+        <p:txBody>
+          <a:bodyPr/>
+          <a:lstStyle/>
+          <a:p>
+            <a:fld id="{123908D8-EB8A-4839-B5DA-E27DEBBAC624}" type="slidenum">
+              <a:rPr lang="en-US" smtClean="0">
+                <a:solidFill>
+                  <a:prstClr val="white"/>
+                </a:solidFill>
+              </a:rPr>
+              <a:pPr/>
+              <a:t>‹#›</a:t>
+            </a:fld>
+            <a:endParaRPr lang="en-US">
+              <a:solidFill>
+                <a:prstClr val="white"/>
+              </a:solidFill>
+            </a:endParaRPr>
+          </a:p>
+        </p:txBody>
+      </p:sp>
+    </p:spTree>
+    <p:extLst>
+      <p:ext uri="{BB962C8B-B14F-4D97-AF65-F5344CB8AC3E}">
+        <p14:creationId xmlns:p14="http://schemas.microsoft.com/office/powerpoint/2010/main" val="779255170"/>
+      </p:ext>
+    </p:extLst>
+  </p:cSld>
+  <p:clrMapOvr>
+    <a:masterClrMapping/>
+  </p:clrMapOvr>
+  <p:timing>
+    <p:tnLst>
+      <p:par>
+        <p:cTn id="1" dur="indefinite" restart="never" nodeType="tmRoot"/>
+      </p:par>
+    </p:tnLst>
+  </p:timing>
+</p:sldLayout>
+</file>
+
+<file path=ppt/slideLayouts/slideLayout5.xml><?xml version="1.0" encoding="utf-8"?>
+<p:sldLayout xmlns:a="http://schemas.openxmlformats.org/drawingml/2006/main" xmlns:r="http://schemas.openxmlformats.org/officeDocument/2006/relationships" xmlns:p="http://schemas.openxmlformats.org/presentationml/2006/main" type="twoTxTwoObj" preserve="1">
+  <p:cSld name="Comparison">
+    <p:spTree>
+      <p:nvGrpSpPr>
+        <p:cNvPr id="1" name=""/>
+        <p:cNvGrpSpPr/>
+        <p:nvPr/>
+      </p:nvGrpSpPr>
+      <p:grpSpPr>
+        <a:xfrm>
+          <a:off x="0" y="0"/>
+          <a:ext cx="0" cy="0"/>
+          <a:chOff x="0" y="0"/>
+          <a:chExt cx="0" cy="0"/>
+        </a:xfrm>
+      </p:grpSpPr>
+      <p:sp>
+        <p:nvSpPr>
+          <p:cNvPr id="2" name="Title 1"/>
+          <p:cNvSpPr>
+            <a:spLocks noGrp="1"/>
+          </p:cNvSpPr>
+          <p:nvPr>
+            <p:ph type="title"/>
+          </p:nvPr>
+        </p:nvSpPr>
+        <p:spPr/>
+        <p:txBody>
+          <a:bodyPr/>
+          <a:lstStyle>
+            <a:lvl1pPr>
+              <a:defRPr/>
+            </a:lvl1pPr>
+          </a:lstStyle>
+          <a:p>
+            <a:r>
+              <a:rPr lang="en-US" smtClean="0"/>
+              <a:t>Click to edit Master title style</a:t>
+            </a:r>
+            <a:endParaRPr lang="en-US"/>
+          </a:p>
+        </p:txBody>
+      </p:sp>
+      <p:sp>
+        <p:nvSpPr>
+          <p:cNvPr id="3" name="Text Placeholder 2"/>
+          <p:cNvSpPr>
+            <a:spLocks noGrp="1"/>
+          </p:cNvSpPr>
+          <p:nvPr>
+            <p:ph type="body" idx="1"/>
+          </p:nvPr>
+        </p:nvSpPr>
+        <p:spPr>
+          <a:xfrm>
+            <a:off x="457200" y="1535113"/>
+            <a:ext cx="4040188" cy="639762"/>
+          </a:xfrm>
+        </p:spPr>
+        <p:txBody>
+          <a:bodyPr anchor="b"/>
+          <a:lstStyle>
+            <a:lvl1pPr marL="0" indent="0">
+              <a:buNone/>
+              <a:defRPr sz="2400" b="1"/>
+            </a:lvl1pPr>
+            <a:lvl2pPr marL="457200" indent="0">
+              <a:buNone/>
+              <a:defRPr sz="2000" b="1"/>
+            </a:lvl2pPr>
+            <a:lvl3pPr marL="914400" indent="0">
+              <a:buNone/>
+              <a:defRPr sz="1800" b="1"/>
+            </a:lvl3pPr>
+            <a:lvl4pPr marL="1371600" indent="0">
+              <a:buNone/>
+              <a:defRPr sz="1600" b="1"/>
+            </a:lvl4pPr>
+            <a:lvl5pPr marL="1828800" indent="0">
+              <a:buNone/>
+              <a:defRPr sz="1600" b="1"/>
+            </a:lvl5pPr>
+            <a:lvl6pPr marL="2286000" indent="0">
+              <a:buNone/>
+              <a:defRPr sz="1600" b="1"/>
+            </a:lvl6pPr>
+            <a:lvl7pPr marL="2743200" indent="0">
+              <a:buNone/>
+              <a:defRPr sz="1600" b="1"/>
+            </a:lvl7pPr>
+            <a:lvl8pPr marL="3200400" indent="0">
+              <a:buNone/>
+              <a:defRPr sz="1600" b="1"/>
+            </a:lvl8pPr>
+            <a:lvl9pPr marL="3657600" indent="0">
+              <a:buNone/>
+              <a:defRPr sz="1600" b="1"/>
+            </a:lvl9pPr>
+          </a:lstStyle>
+          <a:p>
+            <a:pPr lvl="0"/>
+            <a:r>
+              <a:rPr lang="en-US" smtClean="0"/>
+              <a:t>Click to edit Master text styles</a:t>
+            </a:r>
+          </a:p>
+        </p:txBody>
+      </p:sp>
+      <p:sp>
+        <p:nvSpPr>
+          <p:cNvPr id="4" name="Content Placeholder 3"/>
+          <p:cNvSpPr>
+            <a:spLocks noGrp="1"/>
+          </p:cNvSpPr>
+          <p:nvPr>
+            <p:ph sz="half" idx="2"/>
+          </p:nvPr>
+        </p:nvSpPr>
+        <p:spPr>
+          <a:xfrm>
+            <a:off x="457200" y="2174875"/>
+            <a:ext cx="4040188" cy="3951288"/>
+          </a:xfrm>
+        </p:spPr>
+        <p:txBody>
+          <a:bodyPr/>
+          <a:lstStyle>
+            <a:lvl1pPr>
+              <a:defRPr sz="2400"/>
+            </a:lvl1pPr>
+            <a:lvl2pPr>
+              <a:defRPr sz="2000"/>
+            </a:lvl2pPr>
+            <a:lvl3pPr>
+              <a:defRPr sz="1800"/>
+            </a:lvl3pPr>
+            <a:lvl4pPr>
+              <a:defRPr sz="1600"/>
+            </a:lvl4pPr>
+            <a:lvl5pPr>
+              <a:defRPr sz="1600"/>
+            </a:lvl5pPr>
+            <a:lvl6pPr>
+              <a:defRPr sz="1600"/>
+            </a:lvl6pPr>
+            <a:lvl7pPr>
+              <a:defRPr sz="1600"/>
+            </a:lvl7pPr>
+            <a:lvl8pPr>
+              <a:defRPr sz="1600"/>
+            </a:lvl8pPr>
+            <a:lvl9pPr>
+              <a:defRPr sz="1600"/>
+            </a:lvl9pPr>
+          </a:lstStyle>
+          <a:p>
+            <a:pPr lvl="0"/>
+            <a:r>
+              <a:rPr lang="en-US" smtClean="0"/>
+              <a:t>Click to edit Master text styles</a:t>
+            </a:r>
+          </a:p>
+          <a:p>
+            <a:pPr lvl="1"/>
+            <a:r>
+              <a:rPr lang="en-US" smtClean="0"/>
+              <a:t>Second level</a:t>
+            </a:r>
+          </a:p>
+          <a:p>
+            <a:pPr lvl="2"/>
+            <a:r>
+              <a:rPr lang="en-US" smtClean="0"/>
+              <a:t>Third level</a:t>
+            </a:r>
+          </a:p>
+          <a:p>
+            <a:pPr lvl="3"/>
+            <a:r>
+              <a:rPr lang="en-US" smtClean="0"/>
+              <a:t>Fourth level</a:t>
+            </a:r>
+          </a:p>
+          <a:p>
+            <a:pPr lvl="4"/>
+            <a:r>
+              <a:rPr lang="en-US" smtClean="0"/>
+              <a:t>Fifth level</a:t>
+            </a:r>
+            <a:endParaRPr lang="en-US"/>
+          </a:p>
+        </p:txBody>
+      </p:sp>
+      <p:sp>
+        <p:nvSpPr>
+          <p:cNvPr id="5" name="Text Placeholder 4"/>
+          <p:cNvSpPr>
+            <a:spLocks noGrp="1"/>
+          </p:cNvSpPr>
+          <p:nvPr>
+            <p:ph type="body" sz="quarter" idx="3"/>
+          </p:nvPr>
+        </p:nvSpPr>
+        <p:spPr>
+          <a:xfrm>
+            <a:off x="4645025" y="1535113"/>
+            <a:ext cx="4041775" cy="639762"/>
+          </a:xfrm>
+        </p:spPr>
+        <p:txBody>
+          <a:bodyPr anchor="b"/>
+          <a:lstStyle>
+            <a:lvl1pPr marL="0" indent="0">
+              <a:buNone/>
+              <a:defRPr sz="2400" b="1"/>
+            </a:lvl1pPr>
+            <a:lvl2pPr marL="457200" indent="0">
+              <a:buNone/>
+              <a:defRPr sz="2000" b="1"/>
+            </a:lvl2pPr>
+            <a:lvl3pPr marL="914400" indent="0">
+              <a:buNone/>
+              <a:defRPr sz="1800" b="1"/>
+            </a:lvl3pPr>
+            <a:lvl4pPr marL="1371600" indent="0">
+              <a:buNone/>
+              <a:defRPr sz="1600" b="1"/>
+            </a:lvl4pPr>
+            <a:lvl5pPr marL="1828800" indent="0">
+              <a:buNone/>
+              <a:defRPr sz="1600" b="1"/>
+            </a:lvl5pPr>
+            <a:lvl6pPr marL="2286000" indent="0">
+              <a:buNone/>
+              <a:defRPr sz="1600" b="1"/>
+            </a:lvl6pPr>
+            <a:lvl7pPr marL="2743200" indent="0">
+              <a:buNone/>
+              <a:defRPr sz="1600" b="1"/>
+            </a:lvl7pPr>
+            <a:lvl8pPr marL="3200400" indent="0">
+              <a:buNone/>
+              <a:defRPr sz="1600" b="1"/>
+            </a:lvl8pPr>
+            <a:lvl9pPr marL="3657600" indent="0">
+              <a:buNone/>
+              <a:defRPr sz="1600" b="1"/>
+            </a:lvl9pPr>
+          </a:lstStyle>
+          <a:p>
+            <a:pPr lvl="0"/>
+            <a:r>
+              <a:rPr lang="en-US" smtClean="0"/>
+              <a:t>Click to edit Master text styles</a:t>
+            </a:r>
+          </a:p>
+        </p:txBody>
+      </p:sp>
+      <p:sp>
+        <p:nvSpPr>
+          <p:cNvPr id="6" name="Content Placeholder 5"/>
+          <p:cNvSpPr>
+            <a:spLocks noGrp="1"/>
+          </p:cNvSpPr>
+          <p:nvPr>
+            <p:ph sz="quarter" idx="4"/>
+          </p:nvPr>
+        </p:nvSpPr>
+        <p:spPr>
+          <a:xfrm>
+            <a:off x="4645025" y="2174875"/>
+            <a:ext cx="4041775" cy="3951288"/>
+          </a:xfrm>
+        </p:spPr>
+        <p:txBody>
+          <a:bodyPr/>
+          <a:lstStyle>
+            <a:lvl1pPr>
+              <a:defRPr sz="2400"/>
+            </a:lvl1pPr>
+            <a:lvl2pPr>
+              <a:defRPr sz="2000"/>
+            </a:lvl2pPr>
+            <a:lvl3pPr>
+              <a:defRPr sz="1800"/>
+            </a:lvl3pPr>
+            <a:lvl4pPr>
+              <a:defRPr sz="1600"/>
+            </a:lvl4pPr>
+            <a:lvl5pPr>
+              <a:defRPr sz="1600"/>
+            </a:lvl5pPr>
+            <a:lvl6pPr>
+              <a:defRPr sz="1600"/>
+            </a:lvl6pPr>
+            <a:lvl7pPr>
+              <a:defRPr sz="1600"/>
+            </a:lvl7pPr>
+            <a:lvl8pPr>
+              <a:defRPr sz="1600"/>
+            </a:lvl8pPr>
+            <a:lvl9pPr>
+              <a:defRPr sz="1600"/>
+            </a:lvl9pPr>
+          </a:lstStyle>
+          <a:p>
+            <a:pPr lvl="0"/>
+            <a:r>
+              <a:rPr lang="en-US" smtClean="0"/>
+              <a:t>Click to edit Master text styles</a:t>
+            </a:r>
+          </a:p>
+          <a:p>
+            <a:pPr lvl="1"/>
+            <a:r>
+              <a:rPr lang="en-US" smtClean="0"/>
+              <a:t>Second level</a:t>
+            </a:r>
+          </a:p>
+          <a:p>
+            <a:pPr lvl="2"/>
+            <a:r>
+              <a:rPr lang="en-US" smtClean="0"/>
+              <a:t>Third level</a:t>
+            </a:r>
+          </a:p>
+          <a:p>
+            <a:pPr lvl="3"/>
+            <a:r>
+              <a:rPr lang="en-US" smtClean="0"/>
+              <a:t>Fourth level</a:t>
+            </a:r>
+          </a:p>
+          <a:p>
+            <a:pPr lvl="4"/>
+            <a:r>
+              <a:rPr lang="en-US" smtClean="0"/>
+              <a:t>Fifth level</a:t>
+            </a:r>
+            <a:endParaRPr lang="en-US"/>
+          </a:p>
+        </p:txBody>
+      </p:sp>
+      <p:sp>
+        <p:nvSpPr>
+          <p:cNvPr id="7" name="Date Placeholder 6"/>
+          <p:cNvSpPr>
+            <a:spLocks noGrp="1"/>
+          </p:cNvSpPr>
+          <p:nvPr>
+            <p:ph type="dt" sz="half" idx="10"/>
+          </p:nvPr>
+        </p:nvSpPr>
+        <p:spPr/>
+        <p:txBody>
+          <a:bodyPr/>
+          <a:lstStyle/>
+          <a:p>
             <a:fld id="{AFBF1192-2559-4137-A056-32224560FABE}" type="datetimeFigureOut">
               <a:rPr lang="en-US" smtClean="0"/>
               <a:t>11/11/2015</a:t>
@@ -12314,6 +13841,1325 @@
   <p:clrMapOvr>
     <a:masterClrMapping/>
   </p:clrMapOvr>
+</p:sldLayout>
+</file>
+
+<file path=ppt/slideLayouts/slideLayout50.xml><?xml version="1.0" encoding="utf-8"?>
+<p:sldLayout xmlns:a="http://schemas.openxmlformats.org/drawingml/2006/main" xmlns:r="http://schemas.openxmlformats.org/officeDocument/2006/relationships" xmlns:p="http://schemas.openxmlformats.org/presentationml/2006/main" type="titleOnly" preserve="1">
+  <p:cSld name="Title Only">
+    <p:spTree>
+      <p:nvGrpSpPr>
+        <p:cNvPr id="1" name=""/>
+        <p:cNvGrpSpPr/>
+        <p:nvPr/>
+      </p:nvGrpSpPr>
+      <p:grpSpPr>
+        <a:xfrm>
+          <a:off x="0" y="0"/>
+          <a:ext cx="0" cy="0"/>
+          <a:chOff x="0" y="0"/>
+          <a:chExt cx="0" cy="0"/>
+        </a:xfrm>
+      </p:grpSpPr>
+      <p:sp>
+        <p:nvSpPr>
+          <p:cNvPr id="2" name="Title 1"/>
+          <p:cNvSpPr>
+            <a:spLocks noGrp="1"/>
+          </p:cNvSpPr>
+          <p:nvPr>
+            <p:ph type="title"/>
+          </p:nvPr>
+        </p:nvSpPr>
+        <p:spPr/>
+        <p:txBody>
+          <a:bodyPr/>
+          <a:lstStyle/>
+          <a:p>
+            <a:r>
+              <a:rPr lang="en-US" smtClean="0"/>
+              <a:t>Click to edit Master title style</a:t>
+            </a:r>
+            <a:endParaRPr lang="en-US"/>
+          </a:p>
+        </p:txBody>
+      </p:sp>
+      <p:sp>
+        <p:nvSpPr>
+          <p:cNvPr id="3" name="Date Placeholder 2"/>
+          <p:cNvSpPr>
+            <a:spLocks noGrp="1"/>
+          </p:cNvSpPr>
+          <p:nvPr>
+            <p:ph type="dt" sz="half" idx="10"/>
+          </p:nvPr>
+        </p:nvSpPr>
+        <p:spPr/>
+        <p:txBody>
+          <a:bodyPr/>
+          <a:lstStyle/>
+          <a:p>
+            <a:fld id="{B41FAE2C-98F2-4AEB-9028-7681F5825C1E}" type="datetimeFigureOut">
+              <a:rPr lang="en-US" smtClean="0">
+                <a:solidFill>
+                  <a:prstClr val="white"/>
+                </a:solidFill>
+              </a:rPr>
+              <a:pPr/>
+              <a:t>11/11/2015</a:t>
+            </a:fld>
+            <a:endParaRPr lang="en-US">
+              <a:solidFill>
+                <a:prstClr val="white"/>
+              </a:solidFill>
+            </a:endParaRPr>
+          </a:p>
+        </p:txBody>
+      </p:sp>
+      <p:sp>
+        <p:nvSpPr>
+          <p:cNvPr id="4" name="Footer Placeholder 3"/>
+          <p:cNvSpPr>
+            <a:spLocks noGrp="1"/>
+          </p:cNvSpPr>
+          <p:nvPr>
+            <p:ph type="ftr" sz="quarter" idx="11"/>
+          </p:nvPr>
+        </p:nvSpPr>
+        <p:spPr>
+          <a:xfrm>
+            <a:off x="3124200" y="6356350"/>
+            <a:ext cx="2895600" cy="365125"/>
+          </a:xfrm>
+          <a:prstGeom prst="rect">
+            <a:avLst/>
+          </a:prstGeom>
+        </p:spPr>
+        <p:txBody>
+          <a:bodyPr/>
+          <a:lstStyle/>
+          <a:p>
+            <a:endParaRPr lang="en-US">
+              <a:solidFill>
+                <a:prstClr val="black"/>
+              </a:solidFill>
+            </a:endParaRPr>
+          </a:p>
+        </p:txBody>
+      </p:sp>
+      <p:sp>
+        <p:nvSpPr>
+          <p:cNvPr id="5" name="Slide Number Placeholder 4"/>
+          <p:cNvSpPr>
+            <a:spLocks noGrp="1"/>
+          </p:cNvSpPr>
+          <p:nvPr>
+            <p:ph type="sldNum" sz="quarter" idx="12"/>
+          </p:nvPr>
+        </p:nvSpPr>
+        <p:spPr/>
+        <p:txBody>
+          <a:bodyPr/>
+          <a:lstStyle/>
+          <a:p>
+            <a:fld id="{123908D8-EB8A-4839-B5DA-E27DEBBAC624}" type="slidenum">
+              <a:rPr lang="en-US" smtClean="0">
+                <a:solidFill>
+                  <a:prstClr val="white"/>
+                </a:solidFill>
+              </a:rPr>
+              <a:pPr/>
+              <a:t>‹#›</a:t>
+            </a:fld>
+            <a:endParaRPr lang="en-US">
+              <a:solidFill>
+                <a:prstClr val="white"/>
+              </a:solidFill>
+            </a:endParaRPr>
+          </a:p>
+        </p:txBody>
+      </p:sp>
+    </p:spTree>
+    <p:extLst>
+      <p:ext uri="{BB962C8B-B14F-4D97-AF65-F5344CB8AC3E}">
+        <p14:creationId xmlns:p14="http://schemas.microsoft.com/office/powerpoint/2010/main" val="741913686"/>
+      </p:ext>
+    </p:extLst>
+  </p:cSld>
+  <p:clrMapOvr>
+    <a:masterClrMapping/>
+  </p:clrMapOvr>
+  <p:timing>
+    <p:tnLst>
+      <p:par>
+        <p:cTn id="1" dur="indefinite" restart="never" nodeType="tmRoot"/>
+      </p:par>
+    </p:tnLst>
+  </p:timing>
+</p:sldLayout>
+</file>
+
+<file path=ppt/slideLayouts/slideLayout51.xml><?xml version="1.0" encoding="utf-8"?>
+<p:sldLayout xmlns:a="http://schemas.openxmlformats.org/drawingml/2006/main" xmlns:r="http://schemas.openxmlformats.org/officeDocument/2006/relationships" xmlns:p="http://schemas.openxmlformats.org/presentationml/2006/main" type="blank" preserve="1">
+  <p:cSld name="Blank">
+    <p:spTree>
+      <p:nvGrpSpPr>
+        <p:cNvPr id="1" name=""/>
+        <p:cNvGrpSpPr/>
+        <p:nvPr/>
+      </p:nvGrpSpPr>
+      <p:grpSpPr>
+        <a:xfrm>
+          <a:off x="0" y="0"/>
+          <a:ext cx="0" cy="0"/>
+          <a:chOff x="0" y="0"/>
+          <a:chExt cx="0" cy="0"/>
+        </a:xfrm>
+      </p:grpSpPr>
+      <p:sp>
+        <p:nvSpPr>
+          <p:cNvPr id="2" name="Date Placeholder 1"/>
+          <p:cNvSpPr>
+            <a:spLocks noGrp="1"/>
+          </p:cNvSpPr>
+          <p:nvPr>
+            <p:ph type="dt" sz="half" idx="10"/>
+          </p:nvPr>
+        </p:nvSpPr>
+        <p:spPr/>
+        <p:txBody>
+          <a:bodyPr/>
+          <a:lstStyle/>
+          <a:p>
+            <a:fld id="{B41FAE2C-98F2-4AEB-9028-7681F5825C1E}" type="datetimeFigureOut">
+              <a:rPr lang="en-US" smtClean="0">
+                <a:solidFill>
+                  <a:prstClr val="white"/>
+                </a:solidFill>
+              </a:rPr>
+              <a:pPr/>
+              <a:t>11/11/2015</a:t>
+            </a:fld>
+            <a:endParaRPr lang="en-US">
+              <a:solidFill>
+                <a:prstClr val="white"/>
+              </a:solidFill>
+            </a:endParaRPr>
+          </a:p>
+        </p:txBody>
+      </p:sp>
+      <p:sp>
+        <p:nvSpPr>
+          <p:cNvPr id="3" name="Footer Placeholder 2"/>
+          <p:cNvSpPr>
+            <a:spLocks noGrp="1"/>
+          </p:cNvSpPr>
+          <p:nvPr>
+            <p:ph type="ftr" sz="quarter" idx="11"/>
+          </p:nvPr>
+        </p:nvSpPr>
+        <p:spPr>
+          <a:xfrm>
+            <a:off x="3124200" y="6356350"/>
+            <a:ext cx="2895600" cy="365125"/>
+          </a:xfrm>
+          <a:prstGeom prst="rect">
+            <a:avLst/>
+          </a:prstGeom>
+        </p:spPr>
+        <p:txBody>
+          <a:bodyPr/>
+          <a:lstStyle/>
+          <a:p>
+            <a:endParaRPr lang="en-US">
+              <a:solidFill>
+                <a:prstClr val="black"/>
+              </a:solidFill>
+            </a:endParaRPr>
+          </a:p>
+        </p:txBody>
+      </p:sp>
+      <p:sp>
+        <p:nvSpPr>
+          <p:cNvPr id="4" name="Slide Number Placeholder 3"/>
+          <p:cNvSpPr>
+            <a:spLocks noGrp="1"/>
+          </p:cNvSpPr>
+          <p:nvPr>
+            <p:ph type="sldNum" sz="quarter" idx="12"/>
+          </p:nvPr>
+        </p:nvSpPr>
+        <p:spPr/>
+        <p:txBody>
+          <a:bodyPr/>
+          <a:lstStyle/>
+          <a:p>
+            <a:fld id="{123908D8-EB8A-4839-B5DA-E27DEBBAC624}" type="slidenum">
+              <a:rPr lang="en-US" smtClean="0">
+                <a:solidFill>
+                  <a:prstClr val="white"/>
+                </a:solidFill>
+              </a:rPr>
+              <a:pPr/>
+              <a:t>‹#›</a:t>
+            </a:fld>
+            <a:endParaRPr lang="en-US">
+              <a:solidFill>
+                <a:prstClr val="white"/>
+              </a:solidFill>
+            </a:endParaRPr>
+          </a:p>
+        </p:txBody>
+      </p:sp>
+    </p:spTree>
+    <p:extLst>
+      <p:ext uri="{BB962C8B-B14F-4D97-AF65-F5344CB8AC3E}">
+        <p14:creationId xmlns:p14="http://schemas.microsoft.com/office/powerpoint/2010/main" val="1631817536"/>
+      </p:ext>
+    </p:extLst>
+  </p:cSld>
+  <p:clrMapOvr>
+    <a:masterClrMapping/>
+  </p:clrMapOvr>
+  <p:timing>
+    <p:tnLst>
+      <p:par>
+        <p:cTn id="1" dur="indefinite" restart="never" nodeType="tmRoot"/>
+      </p:par>
+    </p:tnLst>
+  </p:timing>
+</p:sldLayout>
+</file>
+
+<file path=ppt/slideLayouts/slideLayout52.xml><?xml version="1.0" encoding="utf-8"?>
+<p:sldLayout xmlns:a="http://schemas.openxmlformats.org/drawingml/2006/main" xmlns:r="http://schemas.openxmlformats.org/officeDocument/2006/relationships" xmlns:p="http://schemas.openxmlformats.org/presentationml/2006/main" type="objTx" preserve="1">
+  <p:cSld name="Content with Caption">
+    <p:spTree>
+      <p:nvGrpSpPr>
+        <p:cNvPr id="1" name=""/>
+        <p:cNvGrpSpPr/>
+        <p:nvPr/>
+      </p:nvGrpSpPr>
+      <p:grpSpPr>
+        <a:xfrm>
+          <a:off x="0" y="0"/>
+          <a:ext cx="0" cy="0"/>
+          <a:chOff x="0" y="0"/>
+          <a:chExt cx="0" cy="0"/>
+        </a:xfrm>
+      </p:grpSpPr>
+      <p:sp>
+        <p:nvSpPr>
+          <p:cNvPr id="2" name="Title 1"/>
+          <p:cNvSpPr>
+            <a:spLocks noGrp="1"/>
+          </p:cNvSpPr>
+          <p:nvPr>
+            <p:ph type="title"/>
+          </p:nvPr>
+        </p:nvSpPr>
+        <p:spPr>
+          <a:xfrm>
+            <a:off x="457200" y="273050"/>
+            <a:ext cx="3008313" cy="1162050"/>
+          </a:xfrm>
+        </p:spPr>
+        <p:txBody>
+          <a:bodyPr anchor="b"/>
+          <a:lstStyle>
+            <a:lvl1pPr algn="l">
+              <a:defRPr sz="2000" b="1"/>
+            </a:lvl1pPr>
+          </a:lstStyle>
+          <a:p>
+            <a:r>
+              <a:rPr lang="en-US" smtClean="0"/>
+              <a:t>Click to edit Master title style</a:t>
+            </a:r>
+            <a:endParaRPr lang="en-US"/>
+          </a:p>
+        </p:txBody>
+      </p:sp>
+      <p:sp>
+        <p:nvSpPr>
+          <p:cNvPr id="3" name="Content Placeholder 2"/>
+          <p:cNvSpPr>
+            <a:spLocks noGrp="1"/>
+          </p:cNvSpPr>
+          <p:nvPr>
+            <p:ph idx="1"/>
+          </p:nvPr>
+        </p:nvSpPr>
+        <p:spPr>
+          <a:xfrm>
+            <a:off x="3575050" y="273050"/>
+            <a:ext cx="5111750" cy="5853113"/>
+          </a:xfrm>
+        </p:spPr>
+        <p:txBody>
+          <a:bodyPr/>
+          <a:lstStyle>
+            <a:lvl1pPr>
+              <a:defRPr sz="3200"/>
+            </a:lvl1pPr>
+            <a:lvl2pPr>
+              <a:defRPr sz="2800"/>
+            </a:lvl2pPr>
+            <a:lvl3pPr>
+              <a:defRPr sz="2400"/>
+            </a:lvl3pPr>
+            <a:lvl4pPr>
+              <a:defRPr sz="2000"/>
+            </a:lvl4pPr>
+            <a:lvl5pPr>
+              <a:defRPr sz="2000"/>
+            </a:lvl5pPr>
+            <a:lvl6pPr>
+              <a:defRPr sz="2000"/>
+            </a:lvl6pPr>
+            <a:lvl7pPr>
+              <a:defRPr sz="2000"/>
+            </a:lvl7pPr>
+            <a:lvl8pPr>
+              <a:defRPr sz="2000"/>
+            </a:lvl8pPr>
+            <a:lvl9pPr>
+              <a:defRPr sz="2000"/>
+            </a:lvl9pPr>
+          </a:lstStyle>
+          <a:p>
+            <a:pPr lvl="0"/>
+            <a:r>
+              <a:rPr lang="en-US" smtClean="0"/>
+              <a:t>Click to edit Master text styles</a:t>
+            </a:r>
+          </a:p>
+          <a:p>
+            <a:pPr lvl="1"/>
+            <a:r>
+              <a:rPr lang="en-US" smtClean="0"/>
+              <a:t>Second level</a:t>
+            </a:r>
+          </a:p>
+          <a:p>
+            <a:pPr lvl="2"/>
+            <a:r>
+              <a:rPr lang="en-US" smtClean="0"/>
+              <a:t>Third level</a:t>
+            </a:r>
+          </a:p>
+          <a:p>
+            <a:pPr lvl="3"/>
+            <a:r>
+              <a:rPr lang="en-US" smtClean="0"/>
+              <a:t>Fourth level</a:t>
+            </a:r>
+          </a:p>
+          <a:p>
+            <a:pPr lvl="4"/>
+            <a:r>
+              <a:rPr lang="en-US" smtClean="0"/>
+              <a:t>Fifth level</a:t>
+            </a:r>
+            <a:endParaRPr lang="en-US"/>
+          </a:p>
+        </p:txBody>
+      </p:sp>
+      <p:sp>
+        <p:nvSpPr>
+          <p:cNvPr id="4" name="Text Placeholder 3"/>
+          <p:cNvSpPr>
+            <a:spLocks noGrp="1"/>
+          </p:cNvSpPr>
+          <p:nvPr>
+            <p:ph type="body" sz="half" idx="2"/>
+          </p:nvPr>
+        </p:nvSpPr>
+        <p:spPr>
+          <a:xfrm>
+            <a:off x="457200" y="1435100"/>
+            <a:ext cx="3008313" cy="4691063"/>
+          </a:xfrm>
+        </p:spPr>
+        <p:txBody>
+          <a:bodyPr/>
+          <a:lstStyle>
+            <a:lvl1pPr marL="0" indent="0">
+              <a:buNone/>
+              <a:defRPr sz="1400"/>
+            </a:lvl1pPr>
+            <a:lvl2pPr marL="457200" indent="0">
+              <a:buNone/>
+              <a:defRPr sz="1200"/>
+            </a:lvl2pPr>
+            <a:lvl3pPr marL="914400" indent="0">
+              <a:buNone/>
+              <a:defRPr sz="1000"/>
+            </a:lvl3pPr>
+            <a:lvl4pPr marL="1371600" indent="0">
+              <a:buNone/>
+              <a:defRPr sz="900"/>
+            </a:lvl4pPr>
+            <a:lvl5pPr marL="1828800" indent="0">
+              <a:buNone/>
+              <a:defRPr sz="900"/>
+            </a:lvl5pPr>
+            <a:lvl6pPr marL="2286000" indent="0">
+              <a:buNone/>
+              <a:defRPr sz="900"/>
+            </a:lvl6pPr>
+            <a:lvl7pPr marL="2743200" indent="0">
+              <a:buNone/>
+              <a:defRPr sz="900"/>
+            </a:lvl7pPr>
+            <a:lvl8pPr marL="3200400" indent="0">
+              <a:buNone/>
+              <a:defRPr sz="900"/>
+            </a:lvl8pPr>
+            <a:lvl9pPr marL="3657600" indent="0">
+              <a:buNone/>
+              <a:defRPr sz="900"/>
+            </a:lvl9pPr>
+          </a:lstStyle>
+          <a:p>
+            <a:pPr lvl="0"/>
+            <a:r>
+              <a:rPr lang="en-US" smtClean="0"/>
+              <a:t>Click to edit Master text styles</a:t>
+            </a:r>
+          </a:p>
+        </p:txBody>
+      </p:sp>
+      <p:sp>
+        <p:nvSpPr>
+          <p:cNvPr id="5" name="Date Placeholder 4"/>
+          <p:cNvSpPr>
+            <a:spLocks noGrp="1"/>
+          </p:cNvSpPr>
+          <p:nvPr>
+            <p:ph type="dt" sz="half" idx="10"/>
+          </p:nvPr>
+        </p:nvSpPr>
+        <p:spPr/>
+        <p:txBody>
+          <a:bodyPr/>
+          <a:lstStyle/>
+          <a:p>
+            <a:fld id="{B41FAE2C-98F2-4AEB-9028-7681F5825C1E}" type="datetimeFigureOut">
+              <a:rPr lang="en-US" smtClean="0">
+                <a:solidFill>
+                  <a:prstClr val="white"/>
+                </a:solidFill>
+              </a:rPr>
+              <a:pPr/>
+              <a:t>11/11/2015</a:t>
+            </a:fld>
+            <a:endParaRPr lang="en-US">
+              <a:solidFill>
+                <a:prstClr val="white"/>
+              </a:solidFill>
+            </a:endParaRPr>
+          </a:p>
+        </p:txBody>
+      </p:sp>
+      <p:sp>
+        <p:nvSpPr>
+          <p:cNvPr id="6" name="Footer Placeholder 5"/>
+          <p:cNvSpPr>
+            <a:spLocks noGrp="1"/>
+          </p:cNvSpPr>
+          <p:nvPr>
+            <p:ph type="ftr" sz="quarter" idx="11"/>
+          </p:nvPr>
+        </p:nvSpPr>
+        <p:spPr>
+          <a:xfrm>
+            <a:off x="3124200" y="6356350"/>
+            <a:ext cx="2895600" cy="365125"/>
+          </a:xfrm>
+          <a:prstGeom prst="rect">
+            <a:avLst/>
+          </a:prstGeom>
+        </p:spPr>
+        <p:txBody>
+          <a:bodyPr/>
+          <a:lstStyle/>
+          <a:p>
+            <a:endParaRPr lang="en-US">
+              <a:solidFill>
+                <a:prstClr val="black"/>
+              </a:solidFill>
+            </a:endParaRPr>
+          </a:p>
+        </p:txBody>
+      </p:sp>
+      <p:sp>
+        <p:nvSpPr>
+          <p:cNvPr id="7" name="Slide Number Placeholder 6"/>
+          <p:cNvSpPr>
+            <a:spLocks noGrp="1"/>
+          </p:cNvSpPr>
+          <p:nvPr>
+            <p:ph type="sldNum" sz="quarter" idx="12"/>
+          </p:nvPr>
+        </p:nvSpPr>
+        <p:spPr/>
+        <p:txBody>
+          <a:bodyPr/>
+          <a:lstStyle/>
+          <a:p>
+            <a:fld id="{123908D8-EB8A-4839-B5DA-E27DEBBAC624}" type="slidenum">
+              <a:rPr lang="en-US" smtClean="0">
+                <a:solidFill>
+                  <a:prstClr val="white"/>
+                </a:solidFill>
+              </a:rPr>
+              <a:pPr/>
+              <a:t>‹#›</a:t>
+            </a:fld>
+            <a:endParaRPr lang="en-US">
+              <a:solidFill>
+                <a:prstClr val="white"/>
+              </a:solidFill>
+            </a:endParaRPr>
+          </a:p>
+        </p:txBody>
+      </p:sp>
+    </p:spTree>
+    <p:extLst>
+      <p:ext uri="{BB962C8B-B14F-4D97-AF65-F5344CB8AC3E}">
+        <p14:creationId xmlns:p14="http://schemas.microsoft.com/office/powerpoint/2010/main" val="916701026"/>
+      </p:ext>
+    </p:extLst>
+  </p:cSld>
+  <p:clrMapOvr>
+    <a:masterClrMapping/>
+  </p:clrMapOvr>
+  <p:timing>
+    <p:tnLst>
+      <p:par>
+        <p:cTn id="1" dur="indefinite" restart="never" nodeType="tmRoot"/>
+      </p:par>
+    </p:tnLst>
+  </p:timing>
+</p:sldLayout>
+</file>
+
+<file path=ppt/slideLayouts/slideLayout53.xml><?xml version="1.0" encoding="utf-8"?>
+<p:sldLayout xmlns:a="http://schemas.openxmlformats.org/drawingml/2006/main" xmlns:r="http://schemas.openxmlformats.org/officeDocument/2006/relationships" xmlns:p="http://schemas.openxmlformats.org/presentationml/2006/main" type="picTx" preserve="1">
+  <p:cSld name="Picture with Caption">
+    <p:spTree>
+      <p:nvGrpSpPr>
+        <p:cNvPr id="1" name=""/>
+        <p:cNvGrpSpPr/>
+        <p:nvPr/>
+      </p:nvGrpSpPr>
+      <p:grpSpPr>
+        <a:xfrm>
+          <a:off x="0" y="0"/>
+          <a:ext cx="0" cy="0"/>
+          <a:chOff x="0" y="0"/>
+          <a:chExt cx="0" cy="0"/>
+        </a:xfrm>
+      </p:grpSpPr>
+      <p:sp>
+        <p:nvSpPr>
+          <p:cNvPr id="2" name="Title 1"/>
+          <p:cNvSpPr>
+            <a:spLocks noGrp="1"/>
+          </p:cNvSpPr>
+          <p:nvPr>
+            <p:ph type="title"/>
+          </p:nvPr>
+        </p:nvSpPr>
+        <p:spPr>
+          <a:xfrm>
+            <a:off x="1792288" y="4800600"/>
+            <a:ext cx="5486400" cy="566738"/>
+          </a:xfrm>
+        </p:spPr>
+        <p:txBody>
+          <a:bodyPr anchor="b"/>
+          <a:lstStyle>
+            <a:lvl1pPr algn="l">
+              <a:defRPr sz="2000" b="1"/>
+            </a:lvl1pPr>
+          </a:lstStyle>
+          <a:p>
+            <a:r>
+              <a:rPr lang="en-US" smtClean="0"/>
+              <a:t>Click to edit Master title style</a:t>
+            </a:r>
+            <a:endParaRPr lang="en-US"/>
+          </a:p>
+        </p:txBody>
+      </p:sp>
+      <p:sp>
+        <p:nvSpPr>
+          <p:cNvPr id="3" name="Picture Placeholder 2"/>
+          <p:cNvSpPr>
+            <a:spLocks noGrp="1"/>
+          </p:cNvSpPr>
+          <p:nvPr>
+            <p:ph type="pic" idx="1"/>
+          </p:nvPr>
+        </p:nvSpPr>
+        <p:spPr>
+          <a:xfrm>
+            <a:off x="1792288" y="612775"/>
+            <a:ext cx="5486400" cy="4114800"/>
+          </a:xfrm>
+        </p:spPr>
+        <p:txBody>
+          <a:bodyPr/>
+          <a:lstStyle>
+            <a:lvl1pPr marL="0" indent="0">
+              <a:buNone/>
+              <a:defRPr sz="3200"/>
+            </a:lvl1pPr>
+            <a:lvl2pPr marL="457200" indent="0">
+              <a:buNone/>
+              <a:defRPr sz="2800"/>
+            </a:lvl2pPr>
+            <a:lvl3pPr marL="914400" indent="0">
+              <a:buNone/>
+              <a:defRPr sz="2400"/>
+            </a:lvl3pPr>
+            <a:lvl4pPr marL="1371600" indent="0">
+              <a:buNone/>
+              <a:defRPr sz="2000"/>
+            </a:lvl4pPr>
+            <a:lvl5pPr marL="1828800" indent="0">
+              <a:buNone/>
+              <a:defRPr sz="2000"/>
+            </a:lvl5pPr>
+            <a:lvl6pPr marL="2286000" indent="0">
+              <a:buNone/>
+              <a:defRPr sz="2000"/>
+            </a:lvl6pPr>
+            <a:lvl7pPr marL="2743200" indent="0">
+              <a:buNone/>
+              <a:defRPr sz="2000"/>
+            </a:lvl7pPr>
+            <a:lvl8pPr marL="3200400" indent="0">
+              <a:buNone/>
+              <a:defRPr sz="2000"/>
+            </a:lvl8pPr>
+            <a:lvl9pPr marL="3657600" indent="0">
+              <a:buNone/>
+              <a:defRPr sz="2000"/>
+            </a:lvl9pPr>
+          </a:lstStyle>
+          <a:p>
+            <a:r>
+              <a:rPr lang="en-US" smtClean="0"/>
+              <a:t>Click icon to add picture</a:t>
+            </a:r>
+            <a:endParaRPr lang="en-US"/>
+          </a:p>
+        </p:txBody>
+      </p:sp>
+      <p:sp>
+        <p:nvSpPr>
+          <p:cNvPr id="4" name="Text Placeholder 3"/>
+          <p:cNvSpPr>
+            <a:spLocks noGrp="1"/>
+          </p:cNvSpPr>
+          <p:nvPr>
+            <p:ph type="body" sz="half" idx="2"/>
+          </p:nvPr>
+        </p:nvSpPr>
+        <p:spPr>
+          <a:xfrm>
+            <a:off x="1792288" y="5367338"/>
+            <a:ext cx="5486400" cy="804862"/>
+          </a:xfrm>
+        </p:spPr>
+        <p:txBody>
+          <a:bodyPr/>
+          <a:lstStyle>
+            <a:lvl1pPr marL="0" indent="0">
+              <a:buNone/>
+              <a:defRPr sz="1400"/>
+            </a:lvl1pPr>
+            <a:lvl2pPr marL="457200" indent="0">
+              <a:buNone/>
+              <a:defRPr sz="1200"/>
+            </a:lvl2pPr>
+            <a:lvl3pPr marL="914400" indent="0">
+              <a:buNone/>
+              <a:defRPr sz="1000"/>
+            </a:lvl3pPr>
+            <a:lvl4pPr marL="1371600" indent="0">
+              <a:buNone/>
+              <a:defRPr sz="900"/>
+            </a:lvl4pPr>
+            <a:lvl5pPr marL="1828800" indent="0">
+              <a:buNone/>
+              <a:defRPr sz="900"/>
+            </a:lvl5pPr>
+            <a:lvl6pPr marL="2286000" indent="0">
+              <a:buNone/>
+              <a:defRPr sz="900"/>
+            </a:lvl6pPr>
+            <a:lvl7pPr marL="2743200" indent="0">
+              <a:buNone/>
+              <a:defRPr sz="900"/>
+            </a:lvl7pPr>
+            <a:lvl8pPr marL="3200400" indent="0">
+              <a:buNone/>
+              <a:defRPr sz="900"/>
+            </a:lvl8pPr>
+            <a:lvl9pPr marL="3657600" indent="0">
+              <a:buNone/>
+              <a:defRPr sz="900"/>
+            </a:lvl9pPr>
+          </a:lstStyle>
+          <a:p>
+            <a:pPr lvl="0"/>
+            <a:r>
+              <a:rPr lang="en-US" smtClean="0"/>
+              <a:t>Click to edit Master text styles</a:t>
+            </a:r>
+          </a:p>
+        </p:txBody>
+      </p:sp>
+      <p:sp>
+        <p:nvSpPr>
+          <p:cNvPr id="5" name="Date Placeholder 4"/>
+          <p:cNvSpPr>
+            <a:spLocks noGrp="1"/>
+          </p:cNvSpPr>
+          <p:nvPr>
+            <p:ph type="dt" sz="half" idx="10"/>
+          </p:nvPr>
+        </p:nvSpPr>
+        <p:spPr/>
+        <p:txBody>
+          <a:bodyPr/>
+          <a:lstStyle/>
+          <a:p>
+            <a:fld id="{B41FAE2C-98F2-4AEB-9028-7681F5825C1E}" type="datetimeFigureOut">
+              <a:rPr lang="en-US" smtClean="0">
+                <a:solidFill>
+                  <a:prstClr val="white"/>
+                </a:solidFill>
+              </a:rPr>
+              <a:pPr/>
+              <a:t>11/11/2015</a:t>
+            </a:fld>
+            <a:endParaRPr lang="en-US">
+              <a:solidFill>
+                <a:prstClr val="white"/>
+              </a:solidFill>
+            </a:endParaRPr>
+          </a:p>
+        </p:txBody>
+      </p:sp>
+      <p:sp>
+        <p:nvSpPr>
+          <p:cNvPr id="6" name="Footer Placeholder 5"/>
+          <p:cNvSpPr>
+            <a:spLocks noGrp="1"/>
+          </p:cNvSpPr>
+          <p:nvPr>
+            <p:ph type="ftr" sz="quarter" idx="11"/>
+          </p:nvPr>
+        </p:nvSpPr>
+        <p:spPr>
+          <a:xfrm>
+            <a:off x="3124200" y="6356350"/>
+            <a:ext cx="2895600" cy="365125"/>
+          </a:xfrm>
+          <a:prstGeom prst="rect">
+            <a:avLst/>
+          </a:prstGeom>
+        </p:spPr>
+        <p:txBody>
+          <a:bodyPr/>
+          <a:lstStyle/>
+          <a:p>
+            <a:endParaRPr lang="en-US">
+              <a:solidFill>
+                <a:prstClr val="black"/>
+              </a:solidFill>
+            </a:endParaRPr>
+          </a:p>
+        </p:txBody>
+      </p:sp>
+      <p:sp>
+        <p:nvSpPr>
+          <p:cNvPr id="7" name="Slide Number Placeholder 6"/>
+          <p:cNvSpPr>
+            <a:spLocks noGrp="1"/>
+          </p:cNvSpPr>
+          <p:nvPr>
+            <p:ph type="sldNum" sz="quarter" idx="12"/>
+          </p:nvPr>
+        </p:nvSpPr>
+        <p:spPr/>
+        <p:txBody>
+          <a:bodyPr/>
+          <a:lstStyle/>
+          <a:p>
+            <a:fld id="{123908D8-EB8A-4839-B5DA-E27DEBBAC624}" type="slidenum">
+              <a:rPr lang="en-US" smtClean="0">
+                <a:solidFill>
+                  <a:prstClr val="white"/>
+                </a:solidFill>
+              </a:rPr>
+              <a:pPr/>
+              <a:t>‹#›</a:t>
+            </a:fld>
+            <a:endParaRPr lang="en-US">
+              <a:solidFill>
+                <a:prstClr val="white"/>
+              </a:solidFill>
+            </a:endParaRPr>
+          </a:p>
+        </p:txBody>
+      </p:sp>
+    </p:spTree>
+    <p:extLst>
+      <p:ext uri="{BB962C8B-B14F-4D97-AF65-F5344CB8AC3E}">
+        <p14:creationId xmlns:p14="http://schemas.microsoft.com/office/powerpoint/2010/main" val="3832064811"/>
+      </p:ext>
+    </p:extLst>
+  </p:cSld>
+  <p:clrMapOvr>
+    <a:masterClrMapping/>
+  </p:clrMapOvr>
+  <p:timing>
+    <p:tnLst>
+      <p:par>
+        <p:cTn id="1" dur="indefinite" restart="never" nodeType="tmRoot"/>
+      </p:par>
+    </p:tnLst>
+  </p:timing>
+</p:sldLayout>
+</file>
+
+<file path=ppt/slideLayouts/slideLayout54.xml><?xml version="1.0" encoding="utf-8"?>
+<p:sldLayout xmlns:a="http://schemas.openxmlformats.org/drawingml/2006/main" xmlns:r="http://schemas.openxmlformats.org/officeDocument/2006/relationships" xmlns:p="http://schemas.openxmlformats.org/presentationml/2006/main" type="vertTx" preserve="1">
+  <p:cSld name="Title and Vertical Text">
+    <p:spTree>
+      <p:nvGrpSpPr>
+        <p:cNvPr id="1" name=""/>
+        <p:cNvGrpSpPr/>
+        <p:nvPr/>
+      </p:nvGrpSpPr>
+      <p:grpSpPr>
+        <a:xfrm>
+          <a:off x="0" y="0"/>
+          <a:ext cx="0" cy="0"/>
+          <a:chOff x="0" y="0"/>
+          <a:chExt cx="0" cy="0"/>
+        </a:xfrm>
+      </p:grpSpPr>
+      <p:sp>
+        <p:nvSpPr>
+          <p:cNvPr id="2" name="Title 1"/>
+          <p:cNvSpPr>
+            <a:spLocks noGrp="1"/>
+          </p:cNvSpPr>
+          <p:nvPr>
+            <p:ph type="title"/>
+          </p:nvPr>
+        </p:nvSpPr>
+        <p:spPr/>
+        <p:txBody>
+          <a:bodyPr/>
+          <a:lstStyle/>
+          <a:p>
+            <a:r>
+              <a:rPr lang="en-US" smtClean="0"/>
+              <a:t>Click to edit Master title style</a:t>
+            </a:r>
+            <a:endParaRPr lang="en-US"/>
+          </a:p>
+        </p:txBody>
+      </p:sp>
+      <p:sp>
+        <p:nvSpPr>
+          <p:cNvPr id="3" name="Vertical Text Placeholder 2"/>
+          <p:cNvSpPr>
+            <a:spLocks noGrp="1"/>
+          </p:cNvSpPr>
+          <p:nvPr>
+            <p:ph type="body" orient="vert" idx="1"/>
+          </p:nvPr>
+        </p:nvSpPr>
+        <p:spPr/>
+        <p:txBody>
+          <a:bodyPr vert="eaVert"/>
+          <a:lstStyle/>
+          <a:p>
+            <a:pPr lvl="0"/>
+            <a:r>
+              <a:rPr lang="en-US" smtClean="0"/>
+              <a:t>Click to edit Master text styles</a:t>
+            </a:r>
+          </a:p>
+          <a:p>
+            <a:pPr lvl="1"/>
+            <a:r>
+              <a:rPr lang="en-US" smtClean="0"/>
+              <a:t>Second level</a:t>
+            </a:r>
+          </a:p>
+          <a:p>
+            <a:pPr lvl="2"/>
+            <a:r>
+              <a:rPr lang="en-US" smtClean="0"/>
+              <a:t>Third level</a:t>
+            </a:r>
+          </a:p>
+          <a:p>
+            <a:pPr lvl="3"/>
+            <a:r>
+              <a:rPr lang="en-US" smtClean="0"/>
+              <a:t>Fourth level</a:t>
+            </a:r>
+          </a:p>
+          <a:p>
+            <a:pPr lvl="4"/>
+            <a:r>
+              <a:rPr lang="en-US" smtClean="0"/>
+              <a:t>Fifth level</a:t>
+            </a:r>
+            <a:endParaRPr lang="en-US"/>
+          </a:p>
+        </p:txBody>
+      </p:sp>
+      <p:sp>
+        <p:nvSpPr>
+          <p:cNvPr id="4" name="Date Placeholder 3"/>
+          <p:cNvSpPr>
+            <a:spLocks noGrp="1"/>
+          </p:cNvSpPr>
+          <p:nvPr>
+            <p:ph type="dt" sz="half" idx="10"/>
+          </p:nvPr>
+        </p:nvSpPr>
+        <p:spPr/>
+        <p:txBody>
+          <a:bodyPr/>
+          <a:lstStyle/>
+          <a:p>
+            <a:fld id="{B41FAE2C-98F2-4AEB-9028-7681F5825C1E}" type="datetimeFigureOut">
+              <a:rPr lang="en-US" smtClean="0">
+                <a:solidFill>
+                  <a:prstClr val="white"/>
+                </a:solidFill>
+              </a:rPr>
+              <a:pPr/>
+              <a:t>11/11/2015</a:t>
+            </a:fld>
+            <a:endParaRPr lang="en-US">
+              <a:solidFill>
+                <a:prstClr val="white"/>
+              </a:solidFill>
+            </a:endParaRPr>
+          </a:p>
+        </p:txBody>
+      </p:sp>
+      <p:sp>
+        <p:nvSpPr>
+          <p:cNvPr id="5" name="Footer Placeholder 4"/>
+          <p:cNvSpPr>
+            <a:spLocks noGrp="1"/>
+          </p:cNvSpPr>
+          <p:nvPr>
+            <p:ph type="ftr" sz="quarter" idx="11"/>
+          </p:nvPr>
+        </p:nvSpPr>
+        <p:spPr>
+          <a:xfrm>
+            <a:off x="3124200" y="6356350"/>
+            <a:ext cx="2895600" cy="365125"/>
+          </a:xfrm>
+          <a:prstGeom prst="rect">
+            <a:avLst/>
+          </a:prstGeom>
+        </p:spPr>
+        <p:txBody>
+          <a:bodyPr/>
+          <a:lstStyle/>
+          <a:p>
+            <a:endParaRPr lang="en-US">
+              <a:solidFill>
+                <a:prstClr val="black"/>
+              </a:solidFill>
+            </a:endParaRPr>
+          </a:p>
+        </p:txBody>
+      </p:sp>
+      <p:sp>
+        <p:nvSpPr>
+          <p:cNvPr id="6" name="Slide Number Placeholder 5"/>
+          <p:cNvSpPr>
+            <a:spLocks noGrp="1"/>
+          </p:cNvSpPr>
+          <p:nvPr>
+            <p:ph type="sldNum" sz="quarter" idx="12"/>
+          </p:nvPr>
+        </p:nvSpPr>
+        <p:spPr/>
+        <p:txBody>
+          <a:bodyPr/>
+          <a:lstStyle/>
+          <a:p>
+            <a:fld id="{123908D8-EB8A-4839-B5DA-E27DEBBAC624}" type="slidenum">
+              <a:rPr lang="en-US" smtClean="0">
+                <a:solidFill>
+                  <a:prstClr val="white"/>
+                </a:solidFill>
+              </a:rPr>
+              <a:pPr/>
+              <a:t>‹#›</a:t>
+            </a:fld>
+            <a:endParaRPr lang="en-US">
+              <a:solidFill>
+                <a:prstClr val="white"/>
+              </a:solidFill>
+            </a:endParaRPr>
+          </a:p>
+        </p:txBody>
+      </p:sp>
+    </p:spTree>
+    <p:extLst>
+      <p:ext uri="{BB962C8B-B14F-4D97-AF65-F5344CB8AC3E}">
+        <p14:creationId xmlns:p14="http://schemas.microsoft.com/office/powerpoint/2010/main" val="2170936412"/>
+      </p:ext>
+    </p:extLst>
+  </p:cSld>
+  <p:clrMapOvr>
+    <a:masterClrMapping/>
+  </p:clrMapOvr>
+  <p:timing>
+    <p:tnLst>
+      <p:par>
+        <p:cTn id="1" dur="indefinite" restart="never" nodeType="tmRoot"/>
+      </p:par>
+    </p:tnLst>
+  </p:timing>
+</p:sldLayout>
+</file>
+
+<file path=ppt/slideLayouts/slideLayout55.xml><?xml version="1.0" encoding="utf-8"?>
+<p:sldLayout xmlns:a="http://schemas.openxmlformats.org/drawingml/2006/main" xmlns:r="http://schemas.openxmlformats.org/officeDocument/2006/relationships" xmlns:p="http://schemas.openxmlformats.org/presentationml/2006/main" type="vertTitleAndTx" preserve="1">
+  <p:cSld name="Vertical Title and Text">
+    <p:spTree>
+      <p:nvGrpSpPr>
+        <p:cNvPr id="1" name=""/>
+        <p:cNvGrpSpPr/>
+        <p:nvPr/>
+      </p:nvGrpSpPr>
+      <p:grpSpPr>
+        <a:xfrm>
+          <a:off x="0" y="0"/>
+          <a:ext cx="0" cy="0"/>
+          <a:chOff x="0" y="0"/>
+          <a:chExt cx="0" cy="0"/>
+        </a:xfrm>
+      </p:grpSpPr>
+      <p:sp>
+        <p:nvSpPr>
+          <p:cNvPr id="2" name="Vertical Title 1"/>
+          <p:cNvSpPr>
+            <a:spLocks noGrp="1"/>
+          </p:cNvSpPr>
+          <p:nvPr>
+            <p:ph type="title" orient="vert"/>
+          </p:nvPr>
+        </p:nvSpPr>
+        <p:spPr>
+          <a:xfrm>
+            <a:off x="6629400" y="274638"/>
+            <a:ext cx="2057400" cy="5851525"/>
+          </a:xfrm>
+        </p:spPr>
+        <p:txBody>
+          <a:bodyPr vert="eaVert"/>
+          <a:lstStyle/>
+          <a:p>
+            <a:r>
+              <a:rPr lang="en-US" smtClean="0"/>
+              <a:t>Click to edit Master title style</a:t>
+            </a:r>
+            <a:endParaRPr lang="en-US"/>
+          </a:p>
+        </p:txBody>
+      </p:sp>
+      <p:sp>
+        <p:nvSpPr>
+          <p:cNvPr id="3" name="Vertical Text Placeholder 2"/>
+          <p:cNvSpPr>
+            <a:spLocks noGrp="1"/>
+          </p:cNvSpPr>
+          <p:nvPr>
+            <p:ph type="body" orient="vert" idx="1"/>
+          </p:nvPr>
+        </p:nvSpPr>
+        <p:spPr>
+          <a:xfrm>
+            <a:off x="457200" y="274638"/>
+            <a:ext cx="6019800" cy="5851525"/>
+          </a:xfrm>
+        </p:spPr>
+        <p:txBody>
+          <a:bodyPr vert="eaVert"/>
+          <a:lstStyle/>
+          <a:p>
+            <a:pPr lvl="0"/>
+            <a:r>
+              <a:rPr lang="en-US" smtClean="0"/>
+              <a:t>Click to edit Master text styles</a:t>
+            </a:r>
+          </a:p>
+          <a:p>
+            <a:pPr lvl="1"/>
+            <a:r>
+              <a:rPr lang="en-US" smtClean="0"/>
+              <a:t>Second level</a:t>
+            </a:r>
+          </a:p>
+          <a:p>
+            <a:pPr lvl="2"/>
+            <a:r>
+              <a:rPr lang="en-US" smtClean="0"/>
+              <a:t>Third level</a:t>
+            </a:r>
+          </a:p>
+          <a:p>
+            <a:pPr lvl="3"/>
+            <a:r>
+              <a:rPr lang="en-US" smtClean="0"/>
+              <a:t>Fourth level</a:t>
+            </a:r>
+          </a:p>
+          <a:p>
+            <a:pPr lvl="4"/>
+            <a:r>
+              <a:rPr lang="en-US" smtClean="0"/>
+              <a:t>Fifth level</a:t>
+            </a:r>
+            <a:endParaRPr lang="en-US"/>
+          </a:p>
+        </p:txBody>
+      </p:sp>
+      <p:sp>
+        <p:nvSpPr>
+          <p:cNvPr id="4" name="Date Placeholder 3"/>
+          <p:cNvSpPr>
+            <a:spLocks noGrp="1"/>
+          </p:cNvSpPr>
+          <p:nvPr>
+            <p:ph type="dt" sz="half" idx="10"/>
+          </p:nvPr>
+        </p:nvSpPr>
+        <p:spPr/>
+        <p:txBody>
+          <a:bodyPr/>
+          <a:lstStyle/>
+          <a:p>
+            <a:fld id="{B41FAE2C-98F2-4AEB-9028-7681F5825C1E}" type="datetimeFigureOut">
+              <a:rPr lang="en-US" smtClean="0">
+                <a:solidFill>
+                  <a:prstClr val="white"/>
+                </a:solidFill>
+              </a:rPr>
+              <a:pPr/>
+              <a:t>11/11/2015</a:t>
+            </a:fld>
+            <a:endParaRPr lang="en-US">
+              <a:solidFill>
+                <a:prstClr val="white"/>
+              </a:solidFill>
+            </a:endParaRPr>
+          </a:p>
+        </p:txBody>
+      </p:sp>
+      <p:sp>
+        <p:nvSpPr>
+          <p:cNvPr id="5" name="Footer Placeholder 4"/>
+          <p:cNvSpPr>
+            <a:spLocks noGrp="1"/>
+          </p:cNvSpPr>
+          <p:nvPr>
+            <p:ph type="ftr" sz="quarter" idx="11"/>
+          </p:nvPr>
+        </p:nvSpPr>
+        <p:spPr>
+          <a:xfrm>
+            <a:off x="3124200" y="6356350"/>
+            <a:ext cx="2895600" cy="365125"/>
+          </a:xfrm>
+          <a:prstGeom prst="rect">
+            <a:avLst/>
+          </a:prstGeom>
+        </p:spPr>
+        <p:txBody>
+          <a:bodyPr/>
+          <a:lstStyle/>
+          <a:p>
+            <a:endParaRPr lang="en-US">
+              <a:solidFill>
+                <a:prstClr val="black"/>
+              </a:solidFill>
+            </a:endParaRPr>
+          </a:p>
+        </p:txBody>
+      </p:sp>
+      <p:sp>
+        <p:nvSpPr>
+          <p:cNvPr id="6" name="Slide Number Placeholder 5"/>
+          <p:cNvSpPr>
+            <a:spLocks noGrp="1"/>
+          </p:cNvSpPr>
+          <p:nvPr>
+            <p:ph type="sldNum" sz="quarter" idx="12"/>
+          </p:nvPr>
+        </p:nvSpPr>
+        <p:spPr/>
+        <p:txBody>
+          <a:bodyPr/>
+          <a:lstStyle/>
+          <a:p>
+            <a:fld id="{123908D8-EB8A-4839-B5DA-E27DEBBAC624}" type="slidenum">
+              <a:rPr lang="en-US" smtClean="0">
+                <a:solidFill>
+                  <a:prstClr val="white"/>
+                </a:solidFill>
+              </a:rPr>
+              <a:pPr/>
+              <a:t>‹#›</a:t>
+            </a:fld>
+            <a:endParaRPr lang="en-US">
+              <a:solidFill>
+                <a:prstClr val="white"/>
+              </a:solidFill>
+            </a:endParaRPr>
+          </a:p>
+        </p:txBody>
+      </p:sp>
+    </p:spTree>
+    <p:extLst>
+      <p:ext uri="{BB962C8B-B14F-4D97-AF65-F5344CB8AC3E}">
+        <p14:creationId xmlns:p14="http://schemas.microsoft.com/office/powerpoint/2010/main" val="2581370354"/>
+      </p:ext>
+    </p:extLst>
+  </p:cSld>
+  <p:clrMapOvr>
+    <a:masterClrMapping/>
+  </p:clrMapOvr>
+  <p:timing>
+    <p:tnLst>
+      <p:par>
+        <p:cTn id="1" dur="indefinite" restart="never" nodeType="tmRoot"/>
+      </p:par>
+    </p:tnLst>
+  </p:timing>
 </p:sldLayout>
 </file>
 
@@ -15055,6 +17901,501 @@
 </p:sldMaster>
 </file>
 
+<file path=ppt/slideMasters/slideMaster5.xml><?xml version="1.0" encoding="utf-8"?>
+<p:sldMaster xmlns:a="http://schemas.openxmlformats.org/drawingml/2006/main" xmlns:r="http://schemas.openxmlformats.org/officeDocument/2006/relationships" xmlns:p="http://schemas.openxmlformats.org/presentationml/2006/main">
+  <p:cSld>
+    <p:bg>
+      <p:bgPr>
+        <a:blipFill rotWithShape="1">
+          <a:blip r:embed="rId13"/>
+          <a:stretch>
+            <a:fillRect/>
+          </a:stretch>
+        </a:blipFill>
+        <a:effectLst/>
+      </p:bgPr>
+    </p:bg>
+    <p:spTree>
+      <p:nvGrpSpPr>
+        <p:cNvPr id="1" name=""/>
+        <p:cNvGrpSpPr/>
+        <p:nvPr/>
+      </p:nvGrpSpPr>
+      <p:grpSpPr>
+        <a:xfrm>
+          <a:off x="0" y="0"/>
+          <a:ext cx="0" cy="0"/>
+          <a:chOff x="0" y="0"/>
+          <a:chExt cx="0" cy="0"/>
+        </a:xfrm>
+      </p:grpSpPr>
+      <p:sp>
+        <p:nvSpPr>
+          <p:cNvPr id="2" name="Title Placeholder 1"/>
+          <p:cNvSpPr>
+            <a:spLocks noGrp="1"/>
+          </p:cNvSpPr>
+          <p:nvPr>
+            <p:ph type="title"/>
+          </p:nvPr>
+        </p:nvSpPr>
+        <p:spPr>
+          <a:xfrm>
+            <a:off x="457200" y="194726"/>
+            <a:ext cx="8229600" cy="397933"/>
+          </a:xfrm>
+          <a:prstGeom prst="rect">
+            <a:avLst/>
+          </a:prstGeom>
+        </p:spPr>
+        <p:txBody>
+          <a:bodyPr vert="horz" lIns="91440" tIns="45720" rIns="91440" bIns="45720" rtlCol="0" anchor="ctr">
+            <a:noAutofit/>
+          </a:bodyPr>
+          <a:lstStyle/>
+          <a:p>
+            <a:r>
+              <a:rPr lang="en-US" smtClean="0"/>
+              <a:t>Click to edit Master title style</a:t>
+            </a:r>
+            <a:endParaRPr lang="en-US" dirty="0"/>
+          </a:p>
+        </p:txBody>
+      </p:sp>
+      <p:sp>
+        <p:nvSpPr>
+          <p:cNvPr id="3" name="Text Placeholder 2"/>
+          <p:cNvSpPr>
+            <a:spLocks noGrp="1"/>
+          </p:cNvSpPr>
+          <p:nvPr>
+            <p:ph type="body" idx="1"/>
+          </p:nvPr>
+        </p:nvSpPr>
+        <p:spPr>
+          <a:xfrm>
+            <a:off x="457200" y="1600200"/>
+            <a:ext cx="8229600" cy="4525963"/>
+          </a:xfrm>
+          <a:prstGeom prst="rect">
+            <a:avLst/>
+          </a:prstGeom>
+        </p:spPr>
+        <p:txBody>
+          <a:bodyPr vert="horz" lIns="91440" tIns="45720" rIns="91440" bIns="45720" rtlCol="0">
+            <a:normAutofit/>
+          </a:bodyPr>
+          <a:lstStyle/>
+          <a:p>
+            <a:pPr lvl="0"/>
+            <a:r>
+              <a:rPr lang="en-US" smtClean="0"/>
+              <a:t>Click to edit Master text styles</a:t>
+            </a:r>
+          </a:p>
+          <a:p>
+            <a:pPr lvl="1"/>
+            <a:r>
+              <a:rPr lang="en-US" smtClean="0"/>
+              <a:t>Second level</a:t>
+            </a:r>
+          </a:p>
+          <a:p>
+            <a:pPr lvl="2"/>
+            <a:r>
+              <a:rPr lang="en-US" smtClean="0"/>
+              <a:t>Third level</a:t>
+            </a:r>
+          </a:p>
+          <a:p>
+            <a:pPr lvl="3"/>
+            <a:r>
+              <a:rPr lang="en-US" smtClean="0"/>
+              <a:t>Fourth level</a:t>
+            </a:r>
+          </a:p>
+          <a:p>
+            <a:pPr lvl="4"/>
+            <a:r>
+              <a:rPr lang="en-US" smtClean="0"/>
+              <a:t>Fifth level</a:t>
+            </a:r>
+            <a:endParaRPr lang="en-US" dirty="0"/>
+          </a:p>
+        </p:txBody>
+      </p:sp>
+      <p:sp>
+        <p:nvSpPr>
+          <p:cNvPr id="4" name="Date Placeholder 3"/>
+          <p:cNvSpPr>
+            <a:spLocks noGrp="1"/>
+          </p:cNvSpPr>
+          <p:nvPr>
+            <p:ph type="dt" sz="half" idx="2"/>
+          </p:nvPr>
+        </p:nvSpPr>
+        <p:spPr>
+          <a:xfrm>
+            <a:off x="3505200" y="6394375"/>
+            <a:ext cx="2133600" cy="365125"/>
+          </a:xfrm>
+          <a:prstGeom prst="rect">
+            <a:avLst/>
+          </a:prstGeom>
+        </p:spPr>
+        <p:txBody>
+          <a:bodyPr vert="horz" lIns="91440" tIns="45720" rIns="91440" bIns="45720" rtlCol="0" anchor="ctr"/>
+          <a:lstStyle>
+            <a:lvl1pPr algn="ctr">
+              <a:defRPr sz="1000">
+                <a:solidFill>
+                  <a:schemeClr val="bg1"/>
+                </a:solidFill>
+                <a:latin typeface="Minion Pro"/>
+              </a:defRPr>
+            </a:lvl1pPr>
+          </a:lstStyle>
+          <a:p>
+            <a:fld id="{B41FAE2C-98F2-4AEB-9028-7681F5825C1E}" type="datetimeFigureOut">
+              <a:rPr lang="en-US" smtClean="0">
+                <a:solidFill>
+                  <a:prstClr val="white"/>
+                </a:solidFill>
+              </a:rPr>
+              <a:pPr/>
+              <a:t>11/11/2015</a:t>
+            </a:fld>
+            <a:endParaRPr lang="en-US">
+              <a:solidFill>
+                <a:prstClr val="white"/>
+              </a:solidFill>
+            </a:endParaRPr>
+          </a:p>
+        </p:txBody>
+      </p:sp>
+      <p:sp>
+        <p:nvSpPr>
+          <p:cNvPr id="6" name="Slide Number Placeholder 5"/>
+          <p:cNvSpPr>
+            <a:spLocks noGrp="1"/>
+          </p:cNvSpPr>
+          <p:nvPr>
+            <p:ph type="sldNum" sz="quarter" idx="4"/>
+          </p:nvPr>
+        </p:nvSpPr>
+        <p:spPr>
+          <a:xfrm>
+            <a:off x="3505200" y="6645425"/>
+            <a:ext cx="2133600" cy="190125"/>
+          </a:xfrm>
+          <a:prstGeom prst="rect">
+            <a:avLst/>
+          </a:prstGeom>
+        </p:spPr>
+        <p:txBody>
+          <a:bodyPr vert="horz" lIns="91440" tIns="45720" rIns="91440" bIns="45720" rtlCol="0" anchor="ctr"/>
+          <a:lstStyle>
+            <a:lvl1pPr algn="ctr">
+              <a:defRPr sz="1000">
+                <a:solidFill>
+                  <a:schemeClr val="bg1"/>
+                </a:solidFill>
+                <a:latin typeface="Minion Pro"/>
+              </a:defRPr>
+            </a:lvl1pPr>
+          </a:lstStyle>
+          <a:p>
+            <a:fld id="{123908D8-EB8A-4839-B5DA-E27DEBBAC624}" type="slidenum">
+              <a:rPr lang="en-US" smtClean="0">
+                <a:solidFill>
+                  <a:prstClr val="white"/>
+                </a:solidFill>
+              </a:rPr>
+              <a:pPr/>
+              <a:t>‹#›</a:t>
+            </a:fld>
+            <a:endParaRPr lang="en-US">
+              <a:solidFill>
+                <a:prstClr val="white"/>
+              </a:solidFill>
+            </a:endParaRPr>
+          </a:p>
+        </p:txBody>
+      </p:sp>
+    </p:spTree>
+    <p:extLst>
+      <p:ext uri="{BB962C8B-B14F-4D97-AF65-F5344CB8AC3E}">
+        <p14:creationId xmlns:p14="http://schemas.microsoft.com/office/powerpoint/2010/main" val="1532350793"/>
+      </p:ext>
+    </p:extLst>
+  </p:cSld>
+  <p:clrMap bg1="lt1" tx1="dk1" bg2="lt2" tx2="dk2" accent1="accent1" accent2="accent2" accent3="accent3" accent4="accent4" accent5="accent5" accent6="accent6" hlink="hlink" folHlink="folHlink"/>
+  <p:sldLayoutIdLst>
+    <p:sldLayoutId id="2147483697" r:id="rId1"/>
+    <p:sldLayoutId id="2147483698" r:id="rId2"/>
+    <p:sldLayoutId id="2147483699" r:id="rId3"/>
+    <p:sldLayoutId id="2147483700" r:id="rId4"/>
+    <p:sldLayoutId id="2147483701" r:id="rId5"/>
+    <p:sldLayoutId id="2147483702" r:id="rId6"/>
+    <p:sldLayoutId id="2147483703" r:id="rId7"/>
+    <p:sldLayoutId id="2147483704" r:id="rId8"/>
+    <p:sldLayoutId id="2147483705" r:id="rId9"/>
+    <p:sldLayoutId id="2147483706" r:id="rId10"/>
+    <p:sldLayoutId id="2147483707" r:id="rId11"/>
+  </p:sldLayoutIdLst>
+  <p:txStyles>
+    <p:titleStyle>
+      <a:lvl1pPr algn="ctr" defTabSz="457200" rtl="0" eaLnBrk="1" latinLnBrk="0" hangingPunct="1">
+        <a:spcBef>
+          <a:spcPct val="0"/>
+        </a:spcBef>
+        <a:buNone/>
+        <a:defRPr sz="4200" kern="1200">
+          <a:solidFill>
+            <a:schemeClr val="tx1"/>
+          </a:solidFill>
+          <a:latin typeface="Minion Pro"/>
+          <a:ea typeface="+mj-ea"/>
+          <a:cs typeface="+mj-cs"/>
+        </a:defRPr>
+      </a:lvl1pPr>
+    </p:titleStyle>
+    <p:bodyStyle>
+      <a:lvl1pPr marL="342900" indent="-342900" algn="l" defTabSz="457200" rtl="0" eaLnBrk="1" latinLnBrk="0" hangingPunct="1">
+        <a:spcBef>
+          <a:spcPct val="20000"/>
+        </a:spcBef>
+        <a:buFont typeface="Arial"/>
+        <a:buChar char="•"/>
+        <a:defRPr sz="3200" kern="1200">
+          <a:solidFill>
+            <a:schemeClr val="tx1"/>
+          </a:solidFill>
+          <a:latin typeface="Minion Pro"/>
+          <a:ea typeface="+mn-ea"/>
+          <a:cs typeface="+mn-cs"/>
+        </a:defRPr>
+      </a:lvl1pPr>
+      <a:lvl2pPr marL="742950" indent="-285750" algn="l" defTabSz="457200" rtl="0" eaLnBrk="1" latinLnBrk="0" hangingPunct="1">
+        <a:spcBef>
+          <a:spcPct val="20000"/>
+        </a:spcBef>
+        <a:buFont typeface="Arial"/>
+        <a:buChar char="–"/>
+        <a:defRPr sz="2800" kern="1200">
+          <a:solidFill>
+            <a:schemeClr val="tx1"/>
+          </a:solidFill>
+          <a:latin typeface="Minion Pro"/>
+          <a:ea typeface="+mn-ea"/>
+          <a:cs typeface="+mn-cs"/>
+        </a:defRPr>
+      </a:lvl2pPr>
+      <a:lvl3pPr marL="1143000" indent="-228600" algn="l" defTabSz="457200" rtl="0" eaLnBrk="1" latinLnBrk="0" hangingPunct="1">
+        <a:spcBef>
+          <a:spcPct val="20000"/>
+        </a:spcBef>
+        <a:buFont typeface="Arial"/>
+        <a:buChar char="•"/>
+        <a:defRPr sz="2400" kern="1200">
+          <a:solidFill>
+            <a:schemeClr val="tx1"/>
+          </a:solidFill>
+          <a:latin typeface="Minion Pro"/>
+          <a:ea typeface="+mn-ea"/>
+          <a:cs typeface="+mn-cs"/>
+        </a:defRPr>
+      </a:lvl3pPr>
+      <a:lvl4pPr marL="1600200" indent="-228600" algn="l" defTabSz="457200" rtl="0" eaLnBrk="1" latinLnBrk="0" hangingPunct="1">
+        <a:spcBef>
+          <a:spcPct val="20000"/>
+        </a:spcBef>
+        <a:buFont typeface="Arial"/>
+        <a:buChar char="–"/>
+        <a:defRPr sz="2000" kern="1200">
+          <a:solidFill>
+            <a:schemeClr val="tx1"/>
+          </a:solidFill>
+          <a:latin typeface="Minion Pro"/>
+          <a:ea typeface="+mn-ea"/>
+          <a:cs typeface="+mn-cs"/>
+        </a:defRPr>
+      </a:lvl4pPr>
+      <a:lvl5pPr marL="2057400" indent="-228600" algn="l" defTabSz="457200" rtl="0" eaLnBrk="1" latinLnBrk="0" hangingPunct="1">
+        <a:spcBef>
+          <a:spcPct val="20000"/>
+        </a:spcBef>
+        <a:buFont typeface="Arial"/>
+        <a:buChar char="»"/>
+        <a:defRPr sz="2000" kern="1200">
+          <a:solidFill>
+            <a:schemeClr val="tx1"/>
+          </a:solidFill>
+          <a:latin typeface="Minion Pro"/>
+          <a:ea typeface="+mn-ea"/>
+          <a:cs typeface="+mn-cs"/>
+        </a:defRPr>
+      </a:lvl5pPr>
+      <a:lvl6pPr marL="2514600" indent="-228600" algn="l" defTabSz="457200" rtl="0" eaLnBrk="1" latinLnBrk="0" hangingPunct="1">
+        <a:spcBef>
+          <a:spcPct val="20000"/>
+        </a:spcBef>
+        <a:buFont typeface="Arial"/>
+        <a:buChar char="•"/>
+        <a:defRPr sz="2000" kern="1200">
+          <a:solidFill>
+            <a:schemeClr val="tx1"/>
+          </a:solidFill>
+          <a:latin typeface="+mn-lt"/>
+          <a:ea typeface="+mn-ea"/>
+          <a:cs typeface="+mn-cs"/>
+        </a:defRPr>
+      </a:lvl6pPr>
+      <a:lvl7pPr marL="2971800" indent="-228600" algn="l" defTabSz="457200" rtl="0" eaLnBrk="1" latinLnBrk="0" hangingPunct="1">
+        <a:spcBef>
+          <a:spcPct val="20000"/>
+        </a:spcBef>
+        <a:buFont typeface="Arial"/>
+        <a:buChar char="•"/>
+        <a:defRPr sz="2000" kern="1200">
+          <a:solidFill>
+            <a:schemeClr val="tx1"/>
+          </a:solidFill>
+          <a:latin typeface="+mn-lt"/>
+          <a:ea typeface="+mn-ea"/>
+          <a:cs typeface="+mn-cs"/>
+        </a:defRPr>
+      </a:lvl7pPr>
+      <a:lvl8pPr marL="3429000" indent="-228600" algn="l" defTabSz="457200" rtl="0" eaLnBrk="1" latinLnBrk="0" hangingPunct="1">
+        <a:spcBef>
+          <a:spcPct val="20000"/>
+        </a:spcBef>
+        <a:buFont typeface="Arial"/>
+        <a:buChar char="•"/>
+        <a:defRPr sz="2000" kern="1200">
+          <a:solidFill>
+            <a:schemeClr val="tx1"/>
+          </a:solidFill>
+          <a:latin typeface="+mn-lt"/>
+          <a:ea typeface="+mn-ea"/>
+          <a:cs typeface="+mn-cs"/>
+        </a:defRPr>
+      </a:lvl8pPr>
+      <a:lvl9pPr marL="3886200" indent="-228600" algn="l" defTabSz="457200" rtl="0" eaLnBrk="1" latinLnBrk="0" hangingPunct="1">
+        <a:spcBef>
+          <a:spcPct val="20000"/>
+        </a:spcBef>
+        <a:buFont typeface="Arial"/>
+        <a:buChar char="•"/>
+        <a:defRPr sz="2000" kern="1200">
+          <a:solidFill>
+            <a:schemeClr val="tx1"/>
+          </a:solidFill>
+          <a:latin typeface="+mn-lt"/>
+          <a:ea typeface="+mn-ea"/>
+          <a:cs typeface="+mn-cs"/>
+        </a:defRPr>
+      </a:lvl9pPr>
+    </p:bodyStyle>
+    <p:otherStyle>
+      <a:defPPr>
+        <a:defRPr lang="en-US"/>
+      </a:defPPr>
+      <a:lvl1pPr marL="0" algn="l" defTabSz="457200" rtl="0" eaLnBrk="1" latinLnBrk="0" hangingPunct="1">
+        <a:defRPr sz="1800" kern="1200">
+          <a:solidFill>
+            <a:schemeClr val="tx1"/>
+          </a:solidFill>
+          <a:latin typeface="+mn-lt"/>
+          <a:ea typeface="+mn-ea"/>
+          <a:cs typeface="+mn-cs"/>
+        </a:defRPr>
+      </a:lvl1pPr>
+      <a:lvl2pPr marL="457200" algn="l" defTabSz="457200" rtl="0" eaLnBrk="1" latinLnBrk="0" hangingPunct="1">
+        <a:defRPr sz="1800" kern="1200">
+          <a:solidFill>
+            <a:schemeClr val="tx1"/>
+          </a:solidFill>
+          <a:latin typeface="+mn-lt"/>
+          <a:ea typeface="+mn-ea"/>
+          <a:cs typeface="+mn-cs"/>
+        </a:defRPr>
+      </a:lvl2pPr>
+      <a:lvl3pPr marL="914400" algn="l" defTabSz="457200" rtl="0" eaLnBrk="1" latinLnBrk="0" hangingPunct="1">
+        <a:defRPr sz="1800" kern="1200">
+          <a:solidFill>
+            <a:schemeClr val="tx1"/>
+          </a:solidFill>
+          <a:latin typeface="+mn-lt"/>
+          <a:ea typeface="+mn-ea"/>
+          <a:cs typeface="+mn-cs"/>
+        </a:defRPr>
+      </a:lvl3pPr>
+      <a:lvl4pPr marL="1371600" algn="l" defTabSz="457200" rtl="0" eaLnBrk="1" latinLnBrk="0" hangingPunct="1">
+        <a:defRPr sz="1800" kern="1200">
+          <a:solidFill>
+            <a:schemeClr val="tx1"/>
+          </a:solidFill>
+          <a:latin typeface="+mn-lt"/>
+          <a:ea typeface="+mn-ea"/>
+          <a:cs typeface="+mn-cs"/>
+        </a:defRPr>
+      </a:lvl4pPr>
+      <a:lvl5pPr marL="1828800" algn="l" defTabSz="457200" rtl="0" eaLnBrk="1" latinLnBrk="0" hangingPunct="1">
+        <a:defRPr sz="1800" kern="1200">
+          <a:solidFill>
+            <a:schemeClr val="tx1"/>
+          </a:solidFill>
+          <a:latin typeface="+mn-lt"/>
+          <a:ea typeface="+mn-ea"/>
+          <a:cs typeface="+mn-cs"/>
+        </a:defRPr>
+      </a:lvl5pPr>
+      <a:lvl6pPr marL="2286000" algn="l" defTabSz="457200" rtl="0" eaLnBrk="1" latinLnBrk="0" hangingPunct="1">
+        <a:defRPr sz="1800" kern="1200">
+          <a:solidFill>
+            <a:schemeClr val="tx1"/>
+          </a:solidFill>
+          <a:latin typeface="+mn-lt"/>
+          <a:ea typeface="+mn-ea"/>
+          <a:cs typeface="+mn-cs"/>
+        </a:defRPr>
+      </a:lvl6pPr>
+      <a:lvl7pPr marL="2743200" algn="l" defTabSz="457200" rtl="0" eaLnBrk="1" latinLnBrk="0" hangingPunct="1">
+        <a:defRPr sz="1800" kern="1200">
+          <a:solidFill>
+            <a:schemeClr val="tx1"/>
+          </a:solidFill>
+          <a:latin typeface="+mn-lt"/>
+          <a:ea typeface="+mn-ea"/>
+          <a:cs typeface="+mn-cs"/>
+        </a:defRPr>
+      </a:lvl7pPr>
+      <a:lvl8pPr marL="3200400" algn="l" defTabSz="457200" rtl="0" eaLnBrk="1" latinLnBrk="0" hangingPunct="1">
+        <a:defRPr sz="1800" kern="1200">
+          <a:solidFill>
+            <a:schemeClr val="tx1"/>
+          </a:solidFill>
+          <a:latin typeface="+mn-lt"/>
+          <a:ea typeface="+mn-ea"/>
+          <a:cs typeface="+mn-cs"/>
+        </a:defRPr>
+      </a:lvl8pPr>
+      <a:lvl9pPr marL="3657600" algn="l" defTabSz="457200" rtl="0" eaLnBrk="1" latinLnBrk="0" hangingPunct="1">
+        <a:defRPr sz="1800" kern="1200">
+          <a:solidFill>
+            <a:schemeClr val="tx1"/>
+          </a:solidFill>
+          <a:latin typeface="+mn-lt"/>
+          <a:ea typeface="+mn-ea"/>
+          <a:cs typeface="+mn-cs"/>
+        </a:defRPr>
+      </a:lvl9pPr>
+    </p:otherStyle>
+  </p:txStyles>
+</p:sldMaster>
+</file>
+
 <file path=ppt/slides/slide1.xml><?xml version="1.0" encoding="utf-8"?>
 <p:sld xmlns:a="http://schemas.openxmlformats.org/drawingml/2006/main" xmlns:r="http://schemas.openxmlformats.org/officeDocument/2006/relationships" xmlns:p="http://schemas.openxmlformats.org/presentationml/2006/main">
   <p:cSld>
@@ -15087,7 +18428,11 @@
           <a:bodyPr/>
           <a:lstStyle/>
           <a:p>
-            <a:endParaRPr lang="en-US"/>
+            <a:r>
+              <a:rPr lang="en-US" dirty="0" smtClean="0"/>
+              <a:t>Removed Slides</a:t>
+            </a:r>
+            <a:endParaRPr lang="en-US" dirty="0"/>
           </a:p>
         </p:txBody>
       </p:sp>
@@ -16540,6 +19885,220 @@
     <p:extLst>
       <p:ext uri="{BB962C8B-B14F-4D97-AF65-F5344CB8AC3E}">
         <p14:creationId xmlns:p14="http://schemas.microsoft.com/office/powerpoint/2010/main" val="1970206970"/>
+      </p:ext>
+    </p:extLst>
+  </p:cSld>
+  <p:clrMapOvr>
+    <a:masterClrMapping/>
+  </p:clrMapOvr>
+  <p:timing>
+    <p:tnLst>
+      <p:par>
+        <p:cTn id="1" dur="indefinite" restart="never" nodeType="tmRoot"/>
+      </p:par>
+    </p:tnLst>
+  </p:timing>
+</p:sld>
+</file>
+
+<file path=ppt/slides/slide5.xml><?xml version="1.0" encoding="utf-8"?>
+<p:sld xmlns:a="http://schemas.openxmlformats.org/drawingml/2006/main" xmlns:r="http://schemas.openxmlformats.org/officeDocument/2006/relationships" xmlns:p="http://schemas.openxmlformats.org/presentationml/2006/main">
+  <p:cSld>
+    <p:spTree>
+      <p:nvGrpSpPr>
+        <p:cNvPr id="1" name=""/>
+        <p:cNvGrpSpPr/>
+        <p:nvPr/>
+      </p:nvGrpSpPr>
+      <p:grpSpPr>
+        <a:xfrm>
+          <a:off x="0" y="0"/>
+          <a:ext cx="0" cy="0"/>
+          <a:chOff x="0" y="0"/>
+          <a:chExt cx="0" cy="0"/>
+        </a:xfrm>
+      </p:grpSpPr>
+      <p:sp>
+        <p:nvSpPr>
+          <p:cNvPr id="2" name="Title 1"/>
+          <p:cNvSpPr>
+            <a:spLocks noGrp="1"/>
+          </p:cNvSpPr>
+          <p:nvPr>
+            <p:ph type="title"/>
+          </p:nvPr>
+        </p:nvSpPr>
+        <p:spPr/>
+        <p:txBody>
+          <a:bodyPr/>
+          <a:lstStyle/>
+          <a:p>
+            <a:r>
+              <a:rPr lang="en-US" dirty="0" smtClean="0"/>
+              <a:t>Status MPD</a:t>
+            </a:r>
+            <a:endParaRPr lang="en-US" dirty="0"/>
+          </a:p>
+        </p:txBody>
+      </p:sp>
+      <p:pic>
+        <p:nvPicPr>
+          <p:cNvPr id="4" name="Picture 3"/>
+          <p:cNvPicPr>
+            <a:picLocks noChangeAspect="1"/>
+          </p:cNvPicPr>
+          <p:nvPr/>
+        </p:nvPicPr>
+        <p:blipFill>
+          <a:blip r:embed="rId2"/>
+          <a:stretch>
+            <a:fillRect/>
+          </a:stretch>
+        </p:blipFill>
+        <p:spPr>
+          <a:xfrm>
+            <a:off x="3657600" y="1752600"/>
+            <a:ext cx="5486400" cy="3395828"/>
+          </a:xfrm>
+          <a:prstGeom prst="rect">
+            <a:avLst/>
+          </a:prstGeom>
+        </p:spPr>
+      </p:pic>
+      <p:sp>
+        <p:nvSpPr>
+          <p:cNvPr id="5" name="Date Placeholder 6"/>
+          <p:cNvSpPr>
+            <a:spLocks noGrp="1"/>
+          </p:cNvSpPr>
+          <p:nvPr>
+            <p:ph type="dt" sz="half" idx="10"/>
+          </p:nvPr>
+        </p:nvSpPr>
+        <p:spPr>
+          <a:xfrm>
+            <a:off x="3505200" y="6394375"/>
+            <a:ext cx="2133600" cy="365125"/>
+          </a:xfrm>
+        </p:spPr>
+        <p:txBody>
+          <a:bodyPr/>
+          <a:lstStyle/>
+          <a:p>
+            <a:fld id="{B41FAE2C-98F2-4AEB-9028-7681F5825C1E}" type="datetimeFigureOut">
+              <a:rPr lang="en-US" smtClean="0">
+                <a:solidFill>
+                  <a:prstClr val="white"/>
+                </a:solidFill>
+              </a:rPr>
+              <a:pPr/>
+              <a:t>11/11/2015</a:t>
+            </a:fld>
+            <a:endParaRPr lang="en-US">
+              <a:solidFill>
+                <a:prstClr val="white"/>
+              </a:solidFill>
+            </a:endParaRPr>
+          </a:p>
+        </p:txBody>
+      </p:sp>
+      <p:sp>
+        <p:nvSpPr>
+          <p:cNvPr id="7" name="Slide Number Placeholder 8"/>
+          <p:cNvSpPr>
+            <a:spLocks noGrp="1"/>
+          </p:cNvSpPr>
+          <p:nvPr>
+            <p:ph type="sldNum" sz="quarter" idx="12"/>
+          </p:nvPr>
+        </p:nvSpPr>
+        <p:spPr>
+          <a:xfrm>
+            <a:off x="3505200" y="6645425"/>
+            <a:ext cx="2133600" cy="190125"/>
+          </a:xfrm>
+        </p:spPr>
+        <p:txBody>
+          <a:bodyPr/>
+          <a:lstStyle/>
+          <a:p>
+            <a:fld id="{123908D8-EB8A-4839-B5DA-E27DEBBAC624}" type="slidenum">
+              <a:rPr lang="en-US" smtClean="0">
+                <a:solidFill>
+                  <a:prstClr val="white"/>
+                </a:solidFill>
+              </a:rPr>
+              <a:pPr/>
+              <a:t>5</a:t>
+            </a:fld>
+            <a:endParaRPr lang="en-US">
+              <a:solidFill>
+                <a:prstClr val="white"/>
+              </a:solidFill>
+            </a:endParaRPr>
+          </a:p>
+        </p:txBody>
+      </p:sp>
+      <p:sp>
+        <p:nvSpPr>
+          <p:cNvPr id="3" name="Content Placeholder 2"/>
+          <p:cNvSpPr>
+            <a:spLocks noGrp="1"/>
+          </p:cNvSpPr>
+          <p:nvPr>
+            <p:ph idx="1"/>
+          </p:nvPr>
+        </p:nvSpPr>
+        <p:spPr>
+          <a:xfrm>
+            <a:off x="304800" y="1371600"/>
+            <a:ext cx="3657600" cy="5029200"/>
+          </a:xfrm>
+        </p:spPr>
+        <p:txBody>
+          <a:bodyPr>
+            <a:normAutofit/>
+          </a:bodyPr>
+          <a:lstStyle/>
+          <a:p>
+            <a:r>
+              <a:rPr lang="en-US" sz="2400" dirty="0" smtClean="0"/>
+              <a:t>VME part works</a:t>
+            </a:r>
+            <a:br>
+              <a:rPr lang="en-US" sz="2400" dirty="0" smtClean="0"/>
+            </a:br>
+            <a:endParaRPr lang="en-US" sz="2400" dirty="0" smtClean="0"/>
+          </a:p>
+          <a:p>
+            <a:r>
+              <a:rPr lang="en-US" sz="2400" dirty="0" smtClean="0"/>
+              <a:t>Data structure looks fine but data from APV has unexpected small dispersion</a:t>
+            </a:r>
+            <a:br>
+              <a:rPr lang="en-US" sz="2400" dirty="0" smtClean="0"/>
+            </a:br>
+            <a:endParaRPr lang="en-US" sz="2400" dirty="0" smtClean="0"/>
+          </a:p>
+          <a:p>
+            <a:r>
+              <a:rPr lang="en-US" sz="2400" dirty="0" smtClean="0"/>
+              <a:t>Maybe issue with APV configuration and/or power supply.</a:t>
+            </a:r>
+          </a:p>
+          <a:p>
+            <a:pPr lvl="1"/>
+            <a:r>
+              <a:rPr lang="en-US" sz="2000" dirty="0" smtClean="0"/>
+              <a:t>being investigated</a:t>
+            </a:r>
+          </a:p>
+        </p:txBody>
+      </p:sp>
+    </p:spTree>
+    <p:extLst>
+      <p:ext uri="{BB962C8B-B14F-4D97-AF65-F5344CB8AC3E}">
+        <p14:creationId xmlns:p14="http://schemas.microsoft.com/office/powerpoint/2010/main" val="3586603214"/>
       </p:ext>
     </p:extLst>
   </p:cSld>
@@ -17793,4 +21352,322 @@
   </a:objectDefaults>
   <a:extraClrSchemeLst/>
 </a:theme>
+</file>
+
+<file path=ppt/theme/theme5.xml><?xml version="1.0" encoding="utf-8"?>
+<a:theme xmlns:a="http://schemas.openxmlformats.org/drawingml/2006/main" name="3_JLab_Theme">
+  <a:themeElements>
+    <a:clrScheme name="Office">
+      <a:dk1>
+        <a:sysClr val="windowText" lastClr="000000"/>
+      </a:dk1>
+      <a:lt1>
+        <a:sysClr val="window" lastClr="FFFFFF"/>
+      </a:lt1>
+      <a:dk2>
+        <a:srgbClr val="1F497D"/>
+      </a:dk2>
+      <a:lt2>
+        <a:srgbClr val="EEECE1"/>
+      </a:lt2>
+      <a:accent1>
+        <a:srgbClr val="4F81BD"/>
+      </a:accent1>
+      <a:accent2>
+        <a:srgbClr val="C0504D"/>
+      </a:accent2>
+      <a:accent3>
+        <a:srgbClr val="9BBB59"/>
+      </a:accent3>
+      <a:accent4>
+        <a:srgbClr val="8064A2"/>
+      </a:accent4>
+      <a:accent5>
+        <a:srgbClr val="4BACC6"/>
+      </a:accent5>
+      <a:accent6>
+        <a:srgbClr val="F79646"/>
+      </a:accent6>
+      <a:hlink>
+        <a:srgbClr val="0000FF"/>
+      </a:hlink>
+      <a:folHlink>
+        <a:srgbClr val="800080"/>
+      </a:folHlink>
+    </a:clrScheme>
+    <a:fontScheme name="Office">
+      <a:majorFont>
+        <a:latin typeface="Calibri"/>
+        <a:ea typeface=""/>
+        <a:cs typeface=""/>
+        <a:font script="Jpan" typeface="ＭＳ Ｐゴシック"/>
+        <a:font script="Hang" typeface="맑은 고딕"/>
+        <a:font script="Hans" typeface="宋体"/>
+        <a:font script="Hant" typeface="新細明體"/>
+        <a:font script="Arab" typeface="Times New Roman"/>
+        <a:font script="Hebr" typeface="Times New Roman"/>
+        <a:font script="Thai" typeface="Angsana New"/>
+        <a:font script="Ethi" typeface="Nyala"/>
+        <a:font script="Beng" typeface="Vrinda"/>
+        <a:font script="Gujr" typeface="Shruti"/>
+        <a:font script="Khmr" typeface="MoolBoran"/>
+        <a:font script="Knda" typeface="Tunga"/>
+        <a:font script="Guru" typeface="Raavi"/>
+        <a:font script="Cans" typeface="Euphemia"/>
+        <a:font script="Cher" typeface="Plantagenet Cherokee"/>
+        <a:font script="Yiii" typeface="Microsoft Yi Baiti"/>
+        <a:font script="Tibt" typeface="Microsoft Himalaya"/>
+        <a:font script="Thaa" typeface="MV Boli"/>
+        <a:font script="Deva" typeface="Mangal"/>
+        <a:font script="Telu" typeface="Gautami"/>
+        <a:font script="Taml" typeface="Latha"/>
+        <a:font script="Syrc" typeface="Estrangelo Edessa"/>
+        <a:font script="Orya" typeface="Kalinga"/>
+        <a:font script="Mlym" typeface="Kartika"/>
+        <a:font script="Laoo" typeface="DokChampa"/>
+        <a:font script="Sinh" typeface="Iskoola Pota"/>
+        <a:font script="Mong" typeface="Mongolian Baiti"/>
+        <a:font script="Viet" typeface="Times New Roman"/>
+        <a:font script="Uigh" typeface="Microsoft Uighur"/>
+      </a:majorFont>
+      <a:minorFont>
+        <a:latin typeface="Calibri"/>
+        <a:ea typeface=""/>
+        <a:cs typeface=""/>
+        <a:font script="Jpan" typeface="ＭＳ Ｐゴシック"/>
+        <a:font script="Hang" typeface="맑은 고딕"/>
+        <a:font script="Hans" typeface="宋体"/>
+        <a:font script="Hant" typeface="新細明體"/>
+        <a:font script="Arab" typeface="Arial"/>
+        <a:font script="Hebr" typeface="Arial"/>
+        <a:font script="Thai" typeface="Cordia New"/>
+        <a:font script="Ethi" typeface="Nyala"/>
+        <a:font script="Beng" typeface="Vrinda"/>
+        <a:font script="Gujr" typeface="Shruti"/>
+        <a:font script="Khmr" typeface="DaunPenh"/>
+        <a:font script="Knda" typeface="Tunga"/>
+        <a:font script="Guru" typeface="Raavi"/>
+        <a:font script="Cans" typeface="Euphemia"/>
+        <a:font script="Cher" typeface="Plantagenet Cherokee"/>
+        <a:font script="Yiii" typeface="Microsoft Yi Baiti"/>
+        <a:font script="Tibt" typeface="Microsoft Himalaya"/>
+        <a:font script="Thaa" typeface="MV Boli"/>
+        <a:font script="Deva" typeface="Mangal"/>
+        <a:font script="Telu" typeface="Gautami"/>
+        <a:font script="Taml" typeface="Latha"/>
+        <a:font script="Syrc" typeface="Estrangelo Edessa"/>
+        <a:font script="Orya" typeface="Kalinga"/>
+        <a:font script="Mlym" typeface="Kartika"/>
+        <a:font script="Laoo" typeface="DokChampa"/>
+        <a:font script="Sinh" typeface="Iskoola Pota"/>
+        <a:font script="Mong" typeface="Mongolian Baiti"/>
+        <a:font script="Viet" typeface="Arial"/>
+        <a:font script="Uigh" typeface="Microsoft Uighur"/>
+      </a:minorFont>
+    </a:fontScheme>
+    <a:fmtScheme name="Office">
+      <a:fillStyleLst>
+        <a:solidFill>
+          <a:schemeClr val="phClr"/>
+        </a:solidFill>
+        <a:gradFill rotWithShape="1">
+          <a:gsLst>
+            <a:gs pos="0">
+              <a:schemeClr val="phClr">
+                <a:tint val="50000"/>
+                <a:satMod val="300000"/>
+              </a:schemeClr>
+            </a:gs>
+            <a:gs pos="35000">
+              <a:schemeClr val="phClr">
+                <a:tint val="37000"/>
+                <a:satMod val="300000"/>
+              </a:schemeClr>
+            </a:gs>
+            <a:gs pos="100000">
+              <a:schemeClr val="phClr">
+                <a:tint val="15000"/>
+                <a:satMod val="350000"/>
+              </a:schemeClr>
+            </a:gs>
+          </a:gsLst>
+          <a:lin ang="16200000" scaled="1"/>
+        </a:gradFill>
+        <a:gradFill rotWithShape="1">
+          <a:gsLst>
+            <a:gs pos="0">
+              <a:schemeClr val="phClr">
+                <a:tint val="100000"/>
+                <a:shade val="100000"/>
+                <a:satMod val="130000"/>
+              </a:schemeClr>
+            </a:gs>
+            <a:gs pos="100000">
+              <a:schemeClr val="phClr">
+                <a:tint val="50000"/>
+                <a:shade val="100000"/>
+                <a:satMod val="350000"/>
+              </a:schemeClr>
+            </a:gs>
+          </a:gsLst>
+          <a:lin ang="16200000" scaled="0"/>
+        </a:gradFill>
+      </a:fillStyleLst>
+      <a:lnStyleLst>
+        <a:ln w="9525" cap="flat" cmpd="sng" algn="ctr">
+          <a:solidFill>
+            <a:schemeClr val="phClr">
+              <a:shade val="95000"/>
+              <a:satMod val="105000"/>
+            </a:schemeClr>
+          </a:solidFill>
+          <a:prstDash val="solid"/>
+        </a:ln>
+        <a:ln w="25400" cap="flat" cmpd="sng" algn="ctr">
+          <a:solidFill>
+            <a:schemeClr val="phClr"/>
+          </a:solidFill>
+          <a:prstDash val="solid"/>
+        </a:ln>
+        <a:ln w="38100" cap="flat" cmpd="sng" algn="ctr">
+          <a:solidFill>
+            <a:schemeClr val="phClr"/>
+          </a:solidFill>
+          <a:prstDash val="solid"/>
+        </a:ln>
+      </a:lnStyleLst>
+      <a:effectStyleLst>
+        <a:effectStyle>
+          <a:effectLst>
+            <a:outerShdw blurRad="40000" dist="20000" dir="5400000" rotWithShape="0">
+              <a:srgbClr val="000000">
+                <a:alpha val="38000"/>
+              </a:srgbClr>
+            </a:outerShdw>
+          </a:effectLst>
+        </a:effectStyle>
+        <a:effectStyle>
+          <a:effectLst>
+            <a:outerShdw blurRad="40000" dist="23000" dir="5400000" rotWithShape="0">
+              <a:srgbClr val="000000">
+                <a:alpha val="35000"/>
+              </a:srgbClr>
+            </a:outerShdw>
+          </a:effectLst>
+        </a:effectStyle>
+        <a:effectStyle>
+          <a:effectLst>
+            <a:outerShdw blurRad="40000" dist="23000" dir="5400000" rotWithShape="0">
+              <a:srgbClr val="000000">
+                <a:alpha val="35000"/>
+              </a:srgbClr>
+            </a:outerShdw>
+          </a:effectLst>
+          <a:scene3d>
+            <a:camera prst="orthographicFront">
+              <a:rot lat="0" lon="0" rev="0"/>
+            </a:camera>
+            <a:lightRig rig="threePt" dir="t">
+              <a:rot lat="0" lon="0" rev="1200000"/>
+            </a:lightRig>
+          </a:scene3d>
+          <a:sp3d>
+            <a:bevelT w="63500" h="25400"/>
+          </a:sp3d>
+        </a:effectStyle>
+      </a:effectStyleLst>
+      <a:bgFillStyleLst>
+        <a:solidFill>
+          <a:schemeClr val="phClr"/>
+        </a:solidFill>
+        <a:gradFill rotWithShape="1">
+          <a:gsLst>
+            <a:gs pos="0">
+              <a:schemeClr val="phClr">
+                <a:tint val="40000"/>
+                <a:satMod val="350000"/>
+              </a:schemeClr>
+            </a:gs>
+            <a:gs pos="40000">
+              <a:schemeClr val="phClr">
+                <a:tint val="45000"/>
+                <a:shade val="99000"/>
+                <a:satMod val="350000"/>
+              </a:schemeClr>
+            </a:gs>
+            <a:gs pos="100000">
+              <a:schemeClr val="phClr">
+                <a:shade val="20000"/>
+                <a:satMod val="255000"/>
+              </a:schemeClr>
+            </a:gs>
+          </a:gsLst>
+          <a:path path="circle">
+            <a:fillToRect l="50000" t="-80000" r="50000" b="180000"/>
+          </a:path>
+        </a:gradFill>
+        <a:gradFill rotWithShape="1">
+          <a:gsLst>
+            <a:gs pos="0">
+              <a:schemeClr val="phClr">
+                <a:tint val="80000"/>
+                <a:satMod val="300000"/>
+              </a:schemeClr>
+            </a:gs>
+            <a:gs pos="100000">
+              <a:schemeClr val="phClr">
+                <a:shade val="30000"/>
+                <a:satMod val="200000"/>
+              </a:schemeClr>
+            </a:gs>
+          </a:gsLst>
+          <a:path path="circle">
+            <a:fillToRect l="50000" t="50000" r="50000" b="50000"/>
+          </a:path>
+        </a:gradFill>
+      </a:bgFillStyleLst>
+    </a:fmtScheme>
+  </a:themeElements>
+  <a:objectDefaults>
+    <a:spDef>
+      <a:spPr/>
+      <a:bodyPr/>
+      <a:lstStyle/>
+      <a:style>
+        <a:lnRef idx="1">
+          <a:schemeClr val="accent1"/>
+        </a:lnRef>
+        <a:fillRef idx="3">
+          <a:schemeClr val="accent1"/>
+        </a:fillRef>
+        <a:effectRef idx="2">
+          <a:schemeClr val="accent1"/>
+        </a:effectRef>
+        <a:fontRef idx="minor">
+          <a:schemeClr val="lt1"/>
+        </a:fontRef>
+      </a:style>
+    </a:spDef>
+    <a:lnDef>
+      <a:spPr/>
+      <a:bodyPr/>
+      <a:lstStyle/>
+      <a:style>
+        <a:lnRef idx="2">
+          <a:schemeClr val="accent1"/>
+        </a:lnRef>
+        <a:fillRef idx="0">
+          <a:schemeClr val="accent1"/>
+        </a:fillRef>
+        <a:effectRef idx="1">
+          <a:schemeClr val="accent1"/>
+        </a:effectRef>
+        <a:fontRef idx="minor">
+          <a:schemeClr val="tx1"/>
+        </a:fontRef>
+      </a:style>
+    </a:lnDef>
+  </a:objectDefaults>
+  <a:extraClrSchemeLst/>
+</a:theme>
 </file>
</xml_diff>